<commit_message>
Version 2 avec les illustrations intégrées
</commit_message>
<xml_diff>
--- a/P7_support.pptx
+++ b/P7_support.pptx
@@ -23,7 +23,6 @@
     <p:sldId id="270" r:id="rId18"/>
     <p:sldId id="271" r:id="rId19"/>
     <p:sldId id="272" r:id="rId20"/>
-    <p:sldId id="273" r:id="rId21"/>
   </p:sldIdLst>
   <p:sldSz cx="12192000" cy="6858000"/>
   <p:notesSz cx="7559675" cy="10691812"/>
@@ -2775,7 +2774,7 @@
         <p:spPr>
           <a:xfrm>
             <a:off x="3240" y="6400800"/>
-            <a:ext cx="12179880" cy="448200"/>
+            <a:ext cx="12179520" cy="447840"/>
           </a:xfrm>
           <a:prstGeom prst="rect">
             <a:avLst/>
@@ -2848,7 +2847,7 @@
         <p:spPr>
           <a:xfrm>
             <a:off x="3240" y="6400800"/>
-            <a:ext cx="12179880" cy="448200"/>
+            <a:ext cx="12179520" cy="447840"/>
           </a:xfrm>
           <a:prstGeom prst="rect">
             <a:avLst/>
@@ -3181,7 +3180,7 @@
         <p:spPr>
           <a:xfrm>
             <a:off x="3240" y="6400800"/>
-            <a:ext cx="12179880" cy="448200"/>
+            <a:ext cx="12179520" cy="447840"/>
           </a:xfrm>
           <a:prstGeom prst="rect">
             <a:avLst/>
@@ -3514,7 +3513,7 @@
         <p:spPr>
           <a:xfrm>
             <a:off x="0" y="0"/>
-            <a:ext cx="12183120" cy="6849000"/>
+            <a:ext cx="12182760" cy="6848640"/>
           </a:xfrm>
           <a:prstGeom prst="rect">
             <a:avLst/>
@@ -3550,7 +3549,7 @@
         <p:spPr>
           <a:xfrm>
             <a:off x="5289840" y="639000"/>
-            <a:ext cx="6244200" cy="3677040"/>
+            <a:ext cx="6243840" cy="3676680"/>
           </a:xfrm>
           <a:prstGeom prst="rect">
             <a:avLst/>
@@ -3601,7 +3600,7 @@
         <p:spPr>
           <a:xfrm>
             <a:off x="5289840" y="4672800"/>
-            <a:ext cx="6805800" cy="1012320"/>
+            <a:ext cx="6805440" cy="1011960"/>
           </a:xfrm>
           <a:prstGeom prst="rect">
             <a:avLst/>
@@ -3662,7 +3661,7 @@
         <p:spPr>
           <a:xfrm>
             <a:off x="0" y="0"/>
-            <a:ext cx="4626360" cy="6849000"/>
+            <a:ext cx="4626000" cy="6848640"/>
           </a:xfrm>
           <a:prstGeom prst="rect">
             <a:avLst/>
@@ -3718,7 +3717,7 @@
         <p:spPr>
           <a:xfrm>
             <a:off x="9157320" y="5885280"/>
-            <a:ext cx="2399400" cy="506520"/>
+            <a:ext cx="2399040" cy="506160"/>
           </a:xfrm>
           <a:prstGeom prst="rect">
             <a:avLst/>
@@ -3775,7 +3774,7 @@
         <p:spPr>
           <a:xfrm>
             <a:off x="6321240" y="6302880"/>
-            <a:ext cx="5175720" cy="248040"/>
+            <a:ext cx="5175360" cy="247680"/>
           </a:xfrm>
           <a:prstGeom prst="rect">
             <a:avLst/>
@@ -3832,7 +3831,7 @@
         <p:spPr>
           <a:xfrm>
             <a:off x="10297080" y="357840"/>
-            <a:ext cx="1541520" cy="363960"/>
+            <a:ext cx="1541160" cy="363960"/>
           </a:xfrm>
           <a:prstGeom prst="rect">
             <a:avLst/>
@@ -3906,14 +3905,14 @@
       </p:grpSpPr>
       <p:sp>
         <p:nvSpPr>
-          <p:cNvPr id="123" name="CustomShape 1"/>
+          <p:cNvPr id="119" name="CustomShape 1"/>
           <p:cNvSpPr/>
           <p:nvPr/>
         </p:nvSpPr>
         <p:spPr>
           <a:xfrm>
-            <a:off x="1044000" y="2160000"/>
-            <a:ext cx="2841120" cy="363960"/>
+            <a:off x="1097280" y="915480"/>
+            <a:ext cx="10049040" cy="930600"/>
           </a:xfrm>
           <a:prstGeom prst="rect">
             <a:avLst/>
@@ -3930,285 +3929,8 @@
           <a:fontRef idx="minor"/>
         </p:style>
         <p:txBody>
-          <a:bodyPr lIns="90000" rIns="90000" tIns="45000" bIns="45000">
-            <a:spAutoFit/>
-          </a:bodyPr>
-          <a:p>
-            <a:pPr>
-              <a:lnSpc>
-                <a:spcPct val="100000"/>
-              </a:lnSpc>
-            </a:pPr>
-            <a:r>
-              <a:rPr b="1" lang="fr-FR" sz="1800" spc="-1" strike="noStrike">
-                <a:solidFill>
-                  <a:srgbClr val="000000"/>
-                </a:solidFill>
-                <a:latin typeface="Franklin Gothic Book"/>
-                <a:ea typeface="DejaVu Sans"/>
-              </a:rPr>
-              <a:t>Méthodologie Image</a:t>
-            </a:r>
-            <a:endParaRPr b="0" lang="fr-FR" sz="1800" spc="-1" strike="noStrike">
-              <a:latin typeface="Arial"/>
-            </a:endParaRPr>
-          </a:p>
-        </p:txBody>
-      </p:sp>
-      <p:pic>
-        <p:nvPicPr>
-          <p:cNvPr id="124" name="" descr=""/>
-          <p:cNvPicPr/>
-          <p:nvPr/>
-        </p:nvPicPr>
-        <p:blipFill>
-          <a:blip r:embed="rId1"/>
-          <a:stretch/>
-        </p:blipFill>
-        <p:spPr>
-          <a:xfrm>
-            <a:off x="2592000" y="2974680"/>
-            <a:ext cx="1016280" cy="1054440"/>
-          </a:xfrm>
-          <a:prstGeom prst="rect">
-            <a:avLst/>
-          </a:prstGeom>
-          <a:ln>
-            <a:noFill/>
-          </a:ln>
-        </p:spPr>
-      </p:pic>
-      <p:pic>
-        <p:nvPicPr>
-          <p:cNvPr id="125" name="" descr=""/>
-          <p:cNvPicPr/>
-          <p:nvPr/>
-        </p:nvPicPr>
-        <p:blipFill>
-          <a:blip r:embed="rId2"/>
-          <a:stretch/>
-        </p:blipFill>
-        <p:spPr>
-          <a:xfrm>
-            <a:off x="4200480" y="650520"/>
-            <a:ext cx="1197360" cy="1435320"/>
-          </a:xfrm>
-          <a:prstGeom prst="rect">
-            <a:avLst/>
-          </a:prstGeom>
-          <a:ln>
-            <a:noFill/>
-          </a:ln>
-        </p:spPr>
-      </p:pic>
-      <p:pic>
-        <p:nvPicPr>
-          <p:cNvPr id="126" name="" descr=""/>
-          <p:cNvPicPr/>
-          <p:nvPr/>
-        </p:nvPicPr>
-        <p:blipFill>
-          <a:blip r:embed="rId3"/>
-          <a:stretch/>
-        </p:blipFill>
-        <p:spPr>
-          <a:xfrm>
-            <a:off x="7636320" y="432000"/>
-            <a:ext cx="1073520" cy="1559160"/>
-          </a:xfrm>
-          <a:prstGeom prst="rect">
-            <a:avLst/>
-          </a:prstGeom>
-          <a:ln>
-            <a:noFill/>
-          </a:ln>
-        </p:spPr>
-      </p:pic>
-      <p:pic>
-        <p:nvPicPr>
-          <p:cNvPr id="127" name="" descr=""/>
-          <p:cNvPicPr/>
-          <p:nvPr/>
-        </p:nvPicPr>
-        <p:blipFill>
-          <a:blip r:embed="rId4"/>
-          <a:stretch/>
-        </p:blipFill>
-        <p:spPr>
-          <a:xfrm>
-            <a:off x="9288000" y="2018880"/>
-            <a:ext cx="1026000" cy="2082960"/>
-          </a:xfrm>
-          <a:prstGeom prst="rect">
-            <a:avLst/>
-          </a:prstGeom>
-          <a:ln>
-            <a:noFill/>
-          </a:ln>
-        </p:spPr>
-      </p:pic>
-      <p:pic>
-        <p:nvPicPr>
-          <p:cNvPr id="128" name="" descr=""/>
-          <p:cNvPicPr/>
-          <p:nvPr/>
-        </p:nvPicPr>
-        <p:blipFill>
-          <a:blip r:embed="rId5"/>
-          <a:stretch/>
-        </p:blipFill>
-        <p:spPr>
-          <a:xfrm>
-            <a:off x="5522400" y="2869560"/>
-            <a:ext cx="1168560" cy="1454400"/>
-          </a:xfrm>
-          <a:prstGeom prst="rect">
-            <a:avLst/>
-          </a:prstGeom>
-          <a:ln>
-            <a:noFill/>
-          </a:ln>
-        </p:spPr>
-      </p:pic>
-      <p:sp>
-        <p:nvSpPr>
-          <p:cNvPr id="129" name="CustomShape 2"/>
-          <p:cNvSpPr/>
-          <p:nvPr/>
-        </p:nvSpPr>
-        <p:spPr>
-          <a:xfrm>
-            <a:off x="2160000" y="4680000"/>
-            <a:ext cx="9105120" cy="912600"/>
-          </a:xfrm>
-          <a:prstGeom prst="rect">
-            <a:avLst/>
-          </a:prstGeom>
-          <a:noFill/>
-          <a:ln>
-            <a:noFill/>
-          </a:ln>
-        </p:spPr>
-        <p:style>
-          <a:lnRef idx="0"/>
-          <a:fillRef idx="0"/>
-          <a:effectRef idx="0"/>
-          <a:fontRef idx="minor"/>
-        </p:style>
-        <p:txBody>
-          <a:bodyPr lIns="90000" rIns="90000" tIns="45000" bIns="45000">
-            <a:spAutoFit/>
-          </a:bodyPr>
-          <a:p>
-            <a:pPr>
-              <a:lnSpc>
-                <a:spcPct val="100000"/>
-              </a:lnSpc>
-            </a:pPr>
-            <a:r>
-              <a:rPr b="0" i="1" lang="fr-FR" sz="1800" spc="-1" strike="noStrike">
-                <a:solidFill>
-                  <a:srgbClr val="000000"/>
-                </a:solidFill>
-                <a:latin typeface="Franklin Gothic Book"/>
-                <a:ea typeface="DejaVu Sans"/>
-              </a:rPr>
-              <a:t>- Extraction des descripteurs (au total 4656) de longueur 128 chacun</a:t>
-            </a:r>
-            <a:endParaRPr b="0" lang="fr-FR" sz="1800" spc="-1" strike="noStrike">
-              <a:latin typeface="Arial"/>
-            </a:endParaRPr>
-          </a:p>
-          <a:p>
-            <a:pPr>
-              <a:lnSpc>
-                <a:spcPct val="100000"/>
-              </a:lnSpc>
-            </a:pPr>
-            <a:endParaRPr b="0" lang="fr-FR" sz="1800" spc="-1" strike="noStrike">
-              <a:latin typeface="Arial"/>
-            </a:endParaRPr>
-          </a:p>
-          <a:p>
-            <a:pPr>
-              <a:lnSpc>
-                <a:spcPct val="100000"/>
-              </a:lnSpc>
-            </a:pPr>
-            <a:r>
-              <a:rPr b="0" i="1" lang="fr-FR" sz="1800" spc="-1" strike="noStrike">
-                <a:solidFill>
-                  <a:srgbClr val="000000"/>
-                </a:solidFill>
-                <a:latin typeface="Franklin Gothic Book"/>
-                <a:ea typeface="DejaVu Sans"/>
-              </a:rPr>
-              <a:t>- Pré-traitement et création des descripteurs avec le modèle SIFT</a:t>
-            </a:r>
-            <a:endParaRPr b="0" lang="fr-FR" sz="1800" spc="-1" strike="noStrike">
-              <a:latin typeface="Arial"/>
-            </a:endParaRPr>
-          </a:p>
-        </p:txBody>
-      </p:sp>
-    </p:spTree>
-  </p:cSld>
-  <mc:AlternateContent>
-    <mc:Choice Requires="p14">
-      <p:transition spd="slow" p14:dur="2000"/>
-    </mc:Choice>
-    <mc:Fallback>
-      <p:transition spd="slow"/>
-    </mc:Fallback>
-  </mc:AlternateContent>
-</p:sld>
-</file>
-
-<file path=ppt/slides/slide11.xml><?xml version="1.0" encoding="utf-8"?>
-<p:sld xmlns:a="http://schemas.openxmlformats.org/drawingml/2006/main" xmlns:p="http://schemas.openxmlformats.org/presentationml/2006/main" xmlns:r="http://schemas.openxmlformats.org/officeDocument/2006/relationships" xmlns:p14="http://schemas.microsoft.com/office/powerpoint/2010/main" xmlns:p15="http://schemas.microsoft.com/office/powerpoint/2012/main" xmlns:mc="http://schemas.openxmlformats.org/markup-compatibility/2006">
-  <p:cSld>
-    <p:spTree>
-      <p:nvGrpSpPr>
-        <p:cNvPr id="1" name=""/>
-        <p:cNvGrpSpPr/>
-        <p:nvPr/>
-      </p:nvGrpSpPr>
-      <p:grpSpPr>
-        <a:xfrm>
-          <a:off x="0" y="0"/>
-          <a:ext cx="0" cy="0"/>
-          <a:chOff x="0" y="0"/>
-          <a:chExt cx="0" cy="0"/>
-        </a:xfrm>
-      </p:grpSpPr>
-      <p:sp>
-        <p:nvSpPr>
-          <p:cNvPr id="130" name="CustomShape 1"/>
-          <p:cNvSpPr/>
-          <p:nvPr/>
-        </p:nvSpPr>
-        <p:spPr>
-          <a:xfrm>
-            <a:off x="1097280" y="915480"/>
-            <a:ext cx="10049400" cy="930960"/>
-          </a:xfrm>
-          <a:prstGeom prst="rect">
-            <a:avLst/>
-          </a:prstGeom>
-          <a:noFill/>
-          <a:ln>
-            <a:noFill/>
-          </a:ln>
-        </p:spPr>
-        <p:style>
-          <a:lnRef idx="0"/>
-          <a:fillRef idx="0"/>
-          <a:effectRef idx="0"/>
-          <a:fontRef idx="minor"/>
-        </p:style>
-        <p:txBody>
           <a:bodyPr lIns="0" rIns="0" tIns="45000" bIns="45000">
-            <a:normAutofit/>
+            <a:normAutofit fontScale="55000"/>
           </a:bodyPr>
           <a:p>
             <a:pPr algn="ctr">
@@ -4224,13 +3946,17 @@
             </a:pPr>
             <a:r>
               <a:rPr b="0" lang="fr-FR" sz="4000" spc="-1" strike="noStrike">
-                <a:solidFill>
-                  <a:srgbClr val="404040"/>
-                </a:solidFill>
                 <a:latin typeface="Franklin Gothic Book"/>
                 <a:ea typeface="DejaVu Sans"/>
               </a:rPr>
-              <a:t>IV – Clustering</a:t>
+              <a:t>IV – </a:t>
+            </a:r>
+            <a:r>
+              <a:rPr b="0" lang="fr-FR" sz="4000" spc="-1" strike="noStrike">
+                <a:latin typeface="Franklin Gothic Book"/>
+                <a:ea typeface="DejaVu Sans"/>
+              </a:rPr>
+              <a:t>Création d’API et déploiement sur le web</a:t>
             </a:r>
             <a:endParaRPr b="0" lang="fr-FR" sz="4000" spc="-1" strike="noStrike">
               <a:latin typeface="Arial"/>
@@ -4240,14 +3966,14 @@
       </p:sp>
       <p:sp>
         <p:nvSpPr>
-          <p:cNvPr id="131" name="CustomShape 2"/>
+          <p:cNvPr id="120" name="CustomShape 2"/>
           <p:cNvSpPr/>
           <p:nvPr/>
         </p:nvSpPr>
         <p:spPr>
           <a:xfrm>
             <a:off x="1296000" y="2232000"/>
-            <a:ext cx="8709480" cy="1461240"/>
+            <a:ext cx="8709120" cy="364680"/>
           </a:xfrm>
           <a:prstGeom prst="rect">
             <a:avLst/>
@@ -4281,94 +4007,24 @@
                 <a:latin typeface="Arial"/>
                 <a:ea typeface="DejaVu Sans"/>
               </a:rPr>
-              <a:t>LE PROCESSUS DE CLASSIFICATION AUTOMATIQUE</a:t>
+              <a:t>Outils utilisés : xxxx</a:t>
             </a:r>
             <a:endParaRPr b="0" lang="fr-FR" sz="1800" spc="-1" strike="noStrike">
               <a:latin typeface="Arial"/>
             </a:endParaRPr>
           </a:p>
-          <a:p>
-            <a:pPr>
-              <a:lnSpc>
-                <a:spcPct val="100000"/>
-              </a:lnSpc>
-            </a:pPr>
-            <a:endParaRPr b="0" lang="fr-FR" sz="1800" spc="-1" strike="noStrike">
-              <a:latin typeface="Arial"/>
-            </a:endParaRPr>
-          </a:p>
-          <a:p>
-            <a:pPr>
-              <a:lnSpc>
-                <a:spcPct val="100000"/>
-              </a:lnSpc>
-            </a:pPr>
-            <a:r>
-              <a:rPr b="0" lang="fr-FR" sz="1800" spc="-1" strike="noStrike">
-                <a:solidFill>
-                  <a:srgbClr val="000000"/>
-                </a:solidFill>
-                <a:latin typeface="Arial"/>
-                <a:ea typeface="DejaVu Sans"/>
-              </a:rPr>
-              <a:t>1- Fournir l’Image de l’article</a:t>
-            </a:r>
-            <a:endParaRPr b="0" lang="fr-FR" sz="1800" spc="-1" strike="noStrike">
-              <a:latin typeface="Arial"/>
-            </a:endParaRPr>
-          </a:p>
-          <a:p>
-            <a:pPr>
-              <a:lnSpc>
-                <a:spcPct val="100000"/>
-              </a:lnSpc>
-            </a:pPr>
-            <a:r>
-              <a:rPr b="0" lang="fr-FR" sz="1800" spc="-1" strike="noStrike">
-                <a:solidFill>
-                  <a:srgbClr val="000000"/>
-                </a:solidFill>
-                <a:latin typeface="Arial"/>
-                <a:ea typeface="DejaVu Sans"/>
-              </a:rPr>
-              <a:t>2- Classifier l’image parmi les clusters issus de entraînement</a:t>
-            </a:r>
-            <a:endParaRPr b="0" lang="fr-FR" sz="1800" spc="-1" strike="noStrike">
-              <a:latin typeface="Arial"/>
-            </a:endParaRPr>
-          </a:p>
-          <a:p>
-            <a:pPr>
-              <a:lnSpc>
-                <a:spcPct val="100000"/>
-              </a:lnSpc>
-            </a:pPr>
-            <a:r>
-              <a:rPr b="0" lang="fr-FR" sz="1800" spc="-1" strike="noStrike">
-                <a:solidFill>
-                  <a:srgbClr val="000000"/>
-                </a:solidFill>
-                <a:latin typeface="Arial"/>
-                <a:ea typeface="DejaVu Sans"/>
-              </a:rPr>
-              <a:t>3- Lier le cluster Image au cluster Texte</a:t>
-            </a:r>
-            <a:endParaRPr b="0" lang="fr-FR" sz="1800" spc="-1" strike="noStrike">
-              <a:latin typeface="Arial"/>
-            </a:endParaRPr>
-          </a:p>
-        </p:txBody>
-      </p:sp>
-      <p:sp>
-        <p:nvSpPr>
-          <p:cNvPr id="132" name="CustomShape 3"/>
+        </p:txBody>
+      </p:sp>
+      <p:sp>
+        <p:nvSpPr>
+          <p:cNvPr id="121" name="CustomShape 3"/>
           <p:cNvSpPr/>
           <p:nvPr/>
         </p:nvSpPr>
         <p:spPr>
           <a:xfrm>
             <a:off x="1368000" y="4536000"/>
-            <a:ext cx="2589480" cy="285480"/>
+            <a:ext cx="2589120" cy="285120"/>
           </a:xfrm>
           <a:custGeom>
             <a:avLst/>
@@ -4420,16 +4076,69 @@
           <a:fontRef idx="minor"/>
         </p:style>
       </p:sp>
-      <p:sp>
-        <p:nvSpPr>
-          <p:cNvPr id="133" name="CustomShape 4"/>
+    </p:spTree>
+  </p:cSld>
+  <mc:AlternateContent>
+    <mc:Choice Requires="p14">
+      <p:transition spd="slow" p14:dur="2000"/>
+    </mc:Choice>
+    <mc:Fallback>
+      <p:transition spd="slow"/>
+    </mc:Fallback>
+  </mc:AlternateContent>
+</p:sld>
+</file>
+
+<file path=ppt/slides/slide11.xml><?xml version="1.0" encoding="utf-8"?>
+<p:sld xmlns:a="http://schemas.openxmlformats.org/drawingml/2006/main" xmlns:p="http://schemas.openxmlformats.org/presentationml/2006/main" xmlns:r="http://schemas.openxmlformats.org/officeDocument/2006/relationships" xmlns:p14="http://schemas.microsoft.com/office/powerpoint/2010/main" xmlns:p15="http://schemas.microsoft.com/office/powerpoint/2012/main" xmlns:mc="http://schemas.openxmlformats.org/markup-compatibility/2006">
+  <p:cSld>
+    <p:spTree>
+      <p:nvGrpSpPr>
+        <p:cNvPr id="1" name=""/>
+        <p:cNvGrpSpPr/>
+        <p:nvPr/>
+      </p:nvGrpSpPr>
+      <p:grpSpPr>
+        <a:xfrm>
+          <a:off x="0" y="0"/>
+          <a:ext cx="0" cy="0"/>
+          <a:chOff x="0" y="0"/>
+          <a:chExt cx="0" cy="0"/>
+        </a:xfrm>
+      </p:grpSpPr>
+      <p:pic>
+        <p:nvPicPr>
+          <p:cNvPr id="122" name="" descr=""/>
+          <p:cNvPicPr/>
+          <p:nvPr/>
+        </p:nvPicPr>
+        <p:blipFill>
+          <a:blip r:embed="rId1"/>
+          <a:stretch/>
+        </p:blipFill>
+        <p:spPr>
+          <a:xfrm>
+            <a:off x="411120" y="813600"/>
+            <a:ext cx="6198840" cy="5589360"/>
+          </a:xfrm>
+          <a:prstGeom prst="rect">
+            <a:avLst/>
+          </a:prstGeom>
+          <a:ln>
+            <a:noFill/>
+          </a:ln>
+        </p:spPr>
+      </p:pic>
+      <p:sp>
+        <p:nvSpPr>
+          <p:cNvPr id="123" name="CustomShape 1"/>
           <p:cNvSpPr/>
           <p:nvPr/>
         </p:nvSpPr>
         <p:spPr>
           <a:xfrm>
-            <a:off x="4392000" y="3996000"/>
-            <a:ext cx="5829480" cy="1461240"/>
+            <a:off x="3312000" y="216000"/>
+            <a:ext cx="7342200" cy="363960"/>
           </a:xfrm>
           <a:prstGeom prst="rect">
             <a:avLst/>
@@ -4463,22 +4172,66 @@
                 <a:latin typeface="Arial"/>
                 <a:ea typeface="DejaVu Sans"/>
               </a:rPr>
-              <a:t>DEUX CLUSTERINGS :</a:t>
+              <a:t>REGRESSIONS OBTENUES PAR DIVERSES</a:t>
             </a:r>
             <a:endParaRPr b="0" lang="fr-FR" sz="1800" spc="-1" strike="noStrike">
               <a:latin typeface="Arial"/>
             </a:endParaRPr>
           </a:p>
-          <a:p>
-            <a:pPr>
-              <a:lnSpc>
-                <a:spcPct val="100000"/>
-              </a:lnSpc>
-            </a:pPr>
-            <a:endParaRPr b="0" lang="fr-FR" sz="1800" spc="-1" strike="noStrike">
-              <a:latin typeface="Arial"/>
-            </a:endParaRPr>
-          </a:p>
+        </p:txBody>
+      </p:sp>
+      <p:pic>
+        <p:nvPicPr>
+          <p:cNvPr id="124" name="" descr=""/>
+          <p:cNvPicPr/>
+          <p:nvPr/>
+        </p:nvPicPr>
+        <p:blipFill>
+          <a:blip r:embed="rId2"/>
+          <a:stretch/>
+        </p:blipFill>
+        <p:spPr>
+          <a:xfrm>
+            <a:off x="7776720" y="1800000"/>
+            <a:ext cx="3741480" cy="3455640"/>
+          </a:xfrm>
+          <a:prstGeom prst="rect">
+            <a:avLst/>
+          </a:prstGeom>
+          <a:ln>
+            <a:noFill/>
+          </a:ln>
+        </p:spPr>
+      </p:pic>
+      <p:sp>
+        <p:nvSpPr>
+          <p:cNvPr id="125" name="CustomShape 2"/>
+          <p:cNvSpPr/>
+          <p:nvPr/>
+        </p:nvSpPr>
+        <p:spPr>
+          <a:xfrm>
+            <a:off x="8784000" y="1296000"/>
+            <a:ext cx="934200" cy="363960"/>
+          </a:xfrm>
+          <a:prstGeom prst="rect">
+            <a:avLst/>
+          </a:prstGeom>
+          <a:noFill/>
+          <a:ln>
+            <a:noFill/>
+          </a:ln>
+        </p:spPr>
+        <p:style>
+          <a:lnRef idx="0"/>
+          <a:fillRef idx="0"/>
+          <a:effectRef idx="0"/>
+          <a:fontRef idx="minor"/>
+        </p:style>
+        <p:txBody>
+          <a:bodyPr lIns="90000" rIns="90000" tIns="45000" bIns="45000">
+            <a:spAutoFit/>
+          </a:bodyPr>
           <a:p>
             <a:pPr>
               <a:lnSpc>
@@ -4493,22 +4246,43 @@
                 <a:latin typeface="Arial"/>
                 <a:ea typeface="DejaVu Sans"/>
               </a:rPr>
-              <a:t>- Clustering Texte (LDA, NMF)</a:t>
+              <a:t>NMF</a:t>
             </a:r>
             <a:endParaRPr b="0" lang="fr-FR" sz="1800" spc="-1" strike="noStrike">
               <a:latin typeface="Arial"/>
             </a:endParaRPr>
           </a:p>
-          <a:p>
-            <a:pPr>
-              <a:lnSpc>
-                <a:spcPct val="100000"/>
-              </a:lnSpc>
-            </a:pPr>
-            <a:endParaRPr b="0" lang="fr-FR" sz="1800" spc="-1" strike="noStrike">
-              <a:latin typeface="Arial"/>
-            </a:endParaRPr>
-          </a:p>
+        </p:txBody>
+      </p:sp>
+      <p:sp>
+        <p:nvSpPr>
+          <p:cNvPr id="126" name="CustomShape 3"/>
+          <p:cNvSpPr/>
+          <p:nvPr/>
+        </p:nvSpPr>
+        <p:spPr>
+          <a:xfrm>
+            <a:off x="3816000" y="1008000"/>
+            <a:ext cx="1114200" cy="363960"/>
+          </a:xfrm>
+          <a:prstGeom prst="rect">
+            <a:avLst/>
+          </a:prstGeom>
+          <a:noFill/>
+          <a:ln>
+            <a:noFill/>
+          </a:ln>
+        </p:spPr>
+        <p:style>
+          <a:lnRef idx="0"/>
+          <a:fillRef idx="0"/>
+          <a:effectRef idx="0"/>
+          <a:fontRef idx="minor"/>
+        </p:style>
+        <p:txBody>
+          <a:bodyPr lIns="90000" rIns="90000" tIns="45000" bIns="45000">
+            <a:spAutoFit/>
+          </a:bodyPr>
           <a:p>
             <a:pPr>
               <a:lnSpc>
@@ -4523,7 +4297,7 @@
                 <a:latin typeface="Arial"/>
                 <a:ea typeface="DejaVu Sans"/>
               </a:rPr>
-              <a:t>- Clustering Image (PCA, T-SNE, KMeans)</a:t>
+              <a:t>LDA</a:t>
             </a:r>
             <a:endParaRPr b="0" lang="fr-FR" sz="1800" spc="-1" strike="noStrike">
               <a:latin typeface="Arial"/>
@@ -4561,39 +4335,16 @@
           <a:chExt cx="0" cy="0"/>
         </a:xfrm>
       </p:grpSpPr>
-      <p:pic>
-        <p:nvPicPr>
-          <p:cNvPr id="134" name="" descr=""/>
-          <p:cNvPicPr/>
-          <p:nvPr/>
-        </p:nvPicPr>
-        <p:blipFill>
-          <a:blip r:embed="rId1"/>
-          <a:stretch/>
-        </p:blipFill>
-        <p:spPr>
-          <a:xfrm>
-            <a:off x="411120" y="813600"/>
-            <a:ext cx="6199200" cy="5589720"/>
-          </a:xfrm>
-          <a:prstGeom prst="rect">
-            <a:avLst/>
-          </a:prstGeom>
-          <a:ln>
-            <a:noFill/>
-          </a:ln>
-        </p:spPr>
-      </p:pic>
-      <p:sp>
-        <p:nvSpPr>
-          <p:cNvPr id="135" name="CustomShape 1"/>
+      <p:sp>
+        <p:nvSpPr>
+          <p:cNvPr id="127" name="CustomShape 1"/>
           <p:cNvSpPr/>
           <p:nvPr/>
         </p:nvSpPr>
         <p:spPr>
           <a:xfrm>
-            <a:off x="3312000" y="216000"/>
-            <a:ext cx="7342560" cy="363960"/>
+            <a:off x="3312000" y="396000"/>
+            <a:ext cx="7342200" cy="363960"/>
           </a:xfrm>
           <a:prstGeom prst="rect">
             <a:avLst/>
@@ -4627,7 +4378,7 @@
                 <a:latin typeface="Arial"/>
                 <a:ea typeface="DejaVu Sans"/>
               </a:rPr>
-              <a:t>REGRESSIONS OBTENUES PAR DIVERSES</a:t>
+              <a:t>TOPICS avec le poids des mots dans le modèle LDA</a:t>
             </a:r>
             <a:endParaRPr b="0" lang="fr-FR" sz="1800" spc="-1" strike="noStrike">
               <a:latin typeface="Arial"/>
@@ -4637,18 +4388,18 @@
       </p:sp>
       <p:pic>
         <p:nvPicPr>
-          <p:cNvPr id="136" name="" descr=""/>
+          <p:cNvPr id="128" name="" descr=""/>
           <p:cNvPicPr/>
           <p:nvPr/>
         </p:nvPicPr>
         <p:blipFill>
-          <a:blip r:embed="rId2"/>
+          <a:blip r:embed="rId1"/>
           <a:stretch/>
         </p:blipFill>
         <p:spPr>
           <a:xfrm>
-            <a:off x="7776720" y="1800000"/>
-            <a:ext cx="3741840" cy="3456000"/>
+            <a:off x="950040" y="848520"/>
+            <a:ext cx="10280880" cy="5511960"/>
           </a:xfrm>
           <a:prstGeom prst="rect">
             <a:avLst/>
@@ -4658,108 +4409,6 @@
           </a:ln>
         </p:spPr>
       </p:pic>
-      <p:sp>
-        <p:nvSpPr>
-          <p:cNvPr id="137" name="CustomShape 2"/>
-          <p:cNvSpPr/>
-          <p:nvPr/>
-        </p:nvSpPr>
-        <p:spPr>
-          <a:xfrm>
-            <a:off x="8784000" y="1296000"/>
-            <a:ext cx="934560" cy="363960"/>
-          </a:xfrm>
-          <a:prstGeom prst="rect">
-            <a:avLst/>
-          </a:prstGeom>
-          <a:noFill/>
-          <a:ln>
-            <a:noFill/>
-          </a:ln>
-        </p:spPr>
-        <p:style>
-          <a:lnRef idx="0"/>
-          <a:fillRef idx="0"/>
-          <a:effectRef idx="0"/>
-          <a:fontRef idx="minor"/>
-        </p:style>
-        <p:txBody>
-          <a:bodyPr lIns="90000" rIns="90000" tIns="45000" bIns="45000">
-            <a:spAutoFit/>
-          </a:bodyPr>
-          <a:p>
-            <a:pPr>
-              <a:lnSpc>
-                <a:spcPct val="100000"/>
-              </a:lnSpc>
-            </a:pPr>
-            <a:r>
-              <a:rPr b="0" lang="fr-FR" sz="1800" spc="-1" strike="noStrike">
-                <a:solidFill>
-                  <a:srgbClr val="000000"/>
-                </a:solidFill>
-                <a:latin typeface="Arial"/>
-                <a:ea typeface="DejaVu Sans"/>
-              </a:rPr>
-              <a:t>NMF</a:t>
-            </a:r>
-            <a:endParaRPr b="0" lang="fr-FR" sz="1800" spc="-1" strike="noStrike">
-              <a:latin typeface="Arial"/>
-            </a:endParaRPr>
-          </a:p>
-        </p:txBody>
-      </p:sp>
-      <p:sp>
-        <p:nvSpPr>
-          <p:cNvPr id="138" name="CustomShape 3"/>
-          <p:cNvSpPr/>
-          <p:nvPr/>
-        </p:nvSpPr>
-        <p:spPr>
-          <a:xfrm>
-            <a:off x="3816000" y="1008000"/>
-            <a:ext cx="1114560" cy="363960"/>
-          </a:xfrm>
-          <a:prstGeom prst="rect">
-            <a:avLst/>
-          </a:prstGeom>
-          <a:noFill/>
-          <a:ln>
-            <a:noFill/>
-          </a:ln>
-        </p:spPr>
-        <p:style>
-          <a:lnRef idx="0"/>
-          <a:fillRef idx="0"/>
-          <a:effectRef idx="0"/>
-          <a:fontRef idx="minor"/>
-        </p:style>
-        <p:txBody>
-          <a:bodyPr lIns="90000" rIns="90000" tIns="45000" bIns="45000">
-            <a:spAutoFit/>
-          </a:bodyPr>
-          <a:p>
-            <a:pPr>
-              <a:lnSpc>
-                <a:spcPct val="100000"/>
-              </a:lnSpc>
-            </a:pPr>
-            <a:r>
-              <a:rPr b="0" lang="fr-FR" sz="1800" spc="-1" strike="noStrike">
-                <a:solidFill>
-                  <a:srgbClr val="000000"/>
-                </a:solidFill>
-                <a:latin typeface="Arial"/>
-                <a:ea typeface="DejaVu Sans"/>
-              </a:rPr>
-              <a:t>LDA</a:t>
-            </a:r>
-            <a:endParaRPr b="0" lang="fr-FR" sz="1800" spc="-1" strike="noStrike">
-              <a:latin typeface="Arial"/>
-            </a:endParaRPr>
-          </a:p>
-        </p:txBody>
-      </p:sp>
     </p:spTree>
   </p:cSld>
   <mc:AlternateContent>
@@ -4792,14 +4441,14 @@
       </p:grpSpPr>
       <p:sp>
         <p:nvSpPr>
-          <p:cNvPr id="139" name="CustomShape 1"/>
+          <p:cNvPr id="129" name="CustomShape 1"/>
           <p:cNvSpPr/>
           <p:nvPr/>
         </p:nvSpPr>
         <p:spPr>
           <a:xfrm>
             <a:off x="3312000" y="396000"/>
-            <a:ext cx="7342560" cy="363960"/>
+            <a:ext cx="7342200" cy="363960"/>
           </a:xfrm>
           <a:prstGeom prst="rect">
             <a:avLst/>
@@ -4833,7 +4482,7 @@
                 <a:latin typeface="Arial"/>
                 <a:ea typeface="DejaVu Sans"/>
               </a:rPr>
-              <a:t>TOPICS avec le poids des mots dans le modèle LDA</a:t>
+              <a:t>TOPICS avec le poids des mots dans le modèle NMF</a:t>
             </a:r>
             <a:endParaRPr b="0" lang="fr-FR" sz="1800" spc="-1" strike="noStrike">
               <a:latin typeface="Arial"/>
@@ -4843,7 +4492,7 @@
       </p:sp>
       <p:pic>
         <p:nvPicPr>
-          <p:cNvPr id="140" name="" descr=""/>
+          <p:cNvPr id="130" name="" descr=""/>
           <p:cNvPicPr/>
           <p:nvPr/>
         </p:nvPicPr>
@@ -4853,8 +4502,8 @@
         </p:blipFill>
         <p:spPr>
           <a:xfrm>
-            <a:off x="950040" y="848520"/>
-            <a:ext cx="10281240" cy="5512320"/>
+            <a:off x="781560" y="763560"/>
+            <a:ext cx="10449360" cy="5613840"/>
           </a:xfrm>
           <a:prstGeom prst="rect">
             <a:avLst/>
@@ -4896,14 +4545,14 @@
       </p:grpSpPr>
       <p:sp>
         <p:nvSpPr>
-          <p:cNvPr id="141" name="CustomShape 1"/>
+          <p:cNvPr id="131" name="CustomShape 1"/>
           <p:cNvSpPr/>
           <p:nvPr/>
         </p:nvSpPr>
         <p:spPr>
           <a:xfrm>
-            <a:off x="3312000" y="396000"/>
-            <a:ext cx="7342560" cy="363960"/>
+            <a:off x="1296000" y="2232000"/>
+            <a:ext cx="8709120" cy="363960"/>
           </a:xfrm>
           <a:prstGeom prst="rect">
             <a:avLst/>
@@ -4937,7 +4586,7 @@
                 <a:latin typeface="Arial"/>
                 <a:ea typeface="DejaVu Sans"/>
               </a:rPr>
-              <a:t>TOPICS avec le poids des mots dans le modèle NMF</a:t>
+              <a:t>CLUSTERING</a:t>
             </a:r>
             <a:endParaRPr b="0" lang="fr-FR" sz="1800" spc="-1" strike="noStrike">
               <a:latin typeface="Arial"/>
@@ -4945,9 +4594,90 @@
           </a:p>
         </p:txBody>
       </p:sp>
+      <p:sp>
+        <p:nvSpPr>
+          <p:cNvPr id="132" name="CustomShape 2"/>
+          <p:cNvSpPr/>
+          <p:nvPr/>
+        </p:nvSpPr>
+        <p:spPr>
+          <a:xfrm>
+            <a:off x="1296000" y="3492000"/>
+            <a:ext cx="2517120" cy="2009880"/>
+          </a:xfrm>
+          <a:prstGeom prst="rect">
+            <a:avLst/>
+          </a:prstGeom>
+          <a:noFill/>
+          <a:ln>
+            <a:noFill/>
+          </a:ln>
+        </p:spPr>
+        <p:style>
+          <a:lnRef idx="0"/>
+          <a:fillRef idx="0"/>
+          <a:effectRef idx="0"/>
+          <a:fontRef idx="minor"/>
+        </p:style>
+        <p:txBody>
+          <a:bodyPr lIns="90000" rIns="90000" tIns="45000" bIns="45000">
+            <a:spAutoFit/>
+          </a:bodyPr>
+          <a:p>
+            <a:pPr>
+              <a:lnSpc>
+                <a:spcPct val="100000"/>
+              </a:lnSpc>
+            </a:pPr>
+            <a:r>
+              <a:rPr b="0" lang="fr-FR" sz="1800" spc="-1" strike="noStrike">
+                <a:solidFill>
+                  <a:srgbClr val="000000"/>
+                </a:solidFill>
+                <a:latin typeface="Arial"/>
+                <a:ea typeface="DejaVu Sans"/>
+              </a:rPr>
+              <a:t>Combinaison de deux méthodes réductions de dimensions : PCA et  T-SNE</a:t>
+            </a:r>
+            <a:endParaRPr b="0" lang="fr-FR" sz="1800" spc="-1" strike="noStrike">
+              <a:latin typeface="Arial"/>
+            </a:endParaRPr>
+          </a:p>
+          <a:p>
+            <a:pPr>
+              <a:lnSpc>
+                <a:spcPct val="100000"/>
+              </a:lnSpc>
+            </a:pPr>
+            <a:endParaRPr b="0" lang="fr-FR" sz="1800" spc="-1" strike="noStrike">
+              <a:latin typeface="Arial"/>
+            </a:endParaRPr>
+          </a:p>
+          <a:p>
+            <a:pPr>
+              <a:lnSpc>
+                <a:spcPct val="100000"/>
+              </a:lnSpc>
+            </a:pPr>
+            <a:r>
+              <a:rPr b="0" lang="fr-FR" sz="1800" spc="-1" strike="noStrike">
+                <a:solidFill>
+                  <a:srgbClr val="000000"/>
+                </a:solidFill>
+                <a:latin typeface="Arial"/>
+                <a:ea typeface="DejaVu Sans"/>
+              </a:rPr>
+              <a:t>Puis application de KMeans</a:t>
+            </a:r>
+            <a:endParaRPr b="0" lang="fr-FR" sz="1800" spc="-1" strike="noStrike">
+              <a:latin typeface="Arial"/>
+            </a:endParaRPr>
+          </a:p>
+        </p:txBody>
+      </p:sp>
       <p:pic>
         <p:nvPicPr>
-          <p:cNvPr id="142" name="" descr=""/>
+          <p:cNvPr id="133" name="" descr=""/>
           <p:cNvPicPr/>
           <p:nvPr/>
         </p:nvPicPr>
@@ -4957,8 +4687,8 @@
         </p:blipFill>
         <p:spPr>
           <a:xfrm>
-            <a:off x="781560" y="763560"/>
-            <a:ext cx="10449720" cy="5614200"/>
+            <a:off x="3929040" y="1728000"/>
+            <a:ext cx="6968160" cy="4707000"/>
           </a:xfrm>
           <a:prstGeom prst="rect">
             <a:avLst/>
@@ -5000,14 +4730,14 @@
       </p:grpSpPr>
       <p:sp>
         <p:nvSpPr>
-          <p:cNvPr id="143" name="CustomShape 1"/>
+          <p:cNvPr id="134" name="CustomShape 1"/>
           <p:cNvSpPr/>
           <p:nvPr/>
         </p:nvSpPr>
         <p:spPr>
           <a:xfrm>
             <a:off x="1296000" y="2232000"/>
-            <a:ext cx="8709480" cy="363960"/>
+            <a:ext cx="8709120" cy="363960"/>
           </a:xfrm>
           <a:prstGeom prst="rect">
             <a:avLst/>
@@ -5041,7 +4771,7 @@
                 <a:latin typeface="Arial"/>
                 <a:ea typeface="DejaVu Sans"/>
               </a:rPr>
-              <a:t>CLUSTERING</a:t>
+              <a:t>MATRICE DE CONFUSION</a:t>
             </a:r>
             <a:endParaRPr b="0" lang="fr-FR" sz="1800" spc="-1" strike="noStrike">
               <a:latin typeface="Arial"/>
@@ -5049,90 +4779,9 @@
           </a:p>
         </p:txBody>
       </p:sp>
-      <p:sp>
-        <p:nvSpPr>
-          <p:cNvPr id="144" name="CustomShape 2"/>
-          <p:cNvSpPr/>
-          <p:nvPr/>
-        </p:nvSpPr>
-        <p:spPr>
-          <a:xfrm>
-            <a:off x="1296000" y="3492000"/>
-            <a:ext cx="2517480" cy="2009880"/>
-          </a:xfrm>
-          <a:prstGeom prst="rect">
-            <a:avLst/>
-          </a:prstGeom>
-          <a:noFill/>
-          <a:ln>
-            <a:noFill/>
-          </a:ln>
-        </p:spPr>
-        <p:style>
-          <a:lnRef idx="0"/>
-          <a:fillRef idx="0"/>
-          <a:effectRef idx="0"/>
-          <a:fontRef idx="minor"/>
-        </p:style>
-        <p:txBody>
-          <a:bodyPr lIns="90000" rIns="90000" tIns="45000" bIns="45000">
-            <a:spAutoFit/>
-          </a:bodyPr>
-          <a:p>
-            <a:pPr>
-              <a:lnSpc>
-                <a:spcPct val="100000"/>
-              </a:lnSpc>
-            </a:pPr>
-            <a:r>
-              <a:rPr b="0" lang="fr-FR" sz="1800" spc="-1" strike="noStrike">
-                <a:solidFill>
-                  <a:srgbClr val="000000"/>
-                </a:solidFill>
-                <a:latin typeface="Arial"/>
-                <a:ea typeface="DejaVu Sans"/>
-              </a:rPr>
-              <a:t>Combinaison de deux méthodes réductions de dimensions : PCA et  T-SNE</a:t>
-            </a:r>
-            <a:endParaRPr b="0" lang="fr-FR" sz="1800" spc="-1" strike="noStrike">
-              <a:latin typeface="Arial"/>
-            </a:endParaRPr>
-          </a:p>
-          <a:p>
-            <a:pPr>
-              <a:lnSpc>
-                <a:spcPct val="100000"/>
-              </a:lnSpc>
-            </a:pPr>
-            <a:endParaRPr b="0" lang="fr-FR" sz="1800" spc="-1" strike="noStrike">
-              <a:latin typeface="Arial"/>
-            </a:endParaRPr>
-          </a:p>
-          <a:p>
-            <a:pPr>
-              <a:lnSpc>
-                <a:spcPct val="100000"/>
-              </a:lnSpc>
-            </a:pPr>
-            <a:r>
-              <a:rPr b="0" lang="fr-FR" sz="1800" spc="-1" strike="noStrike">
-                <a:solidFill>
-                  <a:srgbClr val="000000"/>
-                </a:solidFill>
-                <a:latin typeface="Arial"/>
-                <a:ea typeface="DejaVu Sans"/>
-              </a:rPr>
-              <a:t>Puis application de KMeans</a:t>
-            </a:r>
-            <a:endParaRPr b="0" lang="fr-FR" sz="1800" spc="-1" strike="noStrike">
-              <a:latin typeface="Arial"/>
-            </a:endParaRPr>
-          </a:p>
-        </p:txBody>
-      </p:sp>
       <p:pic>
         <p:nvPicPr>
-          <p:cNvPr id="145" name="" descr=""/>
+          <p:cNvPr id="135" name="" descr=""/>
           <p:cNvPicPr/>
           <p:nvPr/>
         </p:nvPicPr>
@@ -5142,8 +4791,31 @@
         </p:blipFill>
         <p:spPr>
           <a:xfrm>
-            <a:off x="3929040" y="1728000"/>
-            <a:ext cx="6968520" cy="4707360"/>
+            <a:off x="4968000" y="1190160"/>
+            <a:ext cx="5645520" cy="4854960"/>
+          </a:xfrm>
+          <a:prstGeom prst="rect">
+            <a:avLst/>
+          </a:prstGeom>
+          <a:ln>
+            <a:noFill/>
+          </a:ln>
+        </p:spPr>
+      </p:pic>
+      <p:pic>
+        <p:nvPicPr>
+          <p:cNvPr id="136" name="" descr=""/>
+          <p:cNvPicPr/>
+          <p:nvPr/>
+        </p:nvPicPr>
+        <p:blipFill>
+          <a:blip r:embed="rId2"/>
+          <a:stretch/>
+        </p:blipFill>
+        <p:spPr>
+          <a:xfrm>
+            <a:off x="866880" y="3528000"/>
+            <a:ext cx="4026240" cy="2254680"/>
           </a:xfrm>
           <a:prstGeom prst="rect">
             <a:avLst/>
@@ -5185,14 +4857,14 @@
       </p:grpSpPr>
       <p:sp>
         <p:nvSpPr>
-          <p:cNvPr id="146" name="CustomShape 1"/>
+          <p:cNvPr id="137" name="CustomShape 1"/>
           <p:cNvSpPr/>
           <p:nvPr/>
         </p:nvSpPr>
         <p:spPr>
           <a:xfrm>
-            <a:off x="1296000" y="2232000"/>
-            <a:ext cx="8709480" cy="363960"/>
+            <a:off x="1097280" y="879480"/>
+            <a:ext cx="10049040" cy="930600"/>
           </a:xfrm>
           <a:prstGeom prst="rect">
             <a:avLst/>
@@ -5209,6 +4881,63 @@
           <a:fontRef idx="minor"/>
         </p:style>
         <p:txBody>
+          <a:bodyPr lIns="0" rIns="0" tIns="45000" bIns="45000">
+            <a:normAutofit fontScale="55000"/>
+          </a:bodyPr>
+          <a:p>
+            <a:pPr algn="ctr">
+              <a:lnSpc>
+                <a:spcPct val="110000"/>
+              </a:lnSpc>
+              <a:spcBef>
+                <a:spcPts val="1199"/>
+              </a:spcBef>
+              <a:spcAft>
+                <a:spcPts val="201"/>
+              </a:spcAft>
+            </a:pPr>
+            <a:r>
+              <a:rPr b="0" lang="fr-FR" sz="4000" spc="-1" strike="noStrike">
+                <a:solidFill>
+                  <a:srgbClr val="404040"/>
+                </a:solidFill>
+                <a:latin typeface="Franklin Gothic Book"/>
+                <a:ea typeface="DejaVu Sans"/>
+              </a:rPr>
+              <a:t>V – Conclusion et recommandation sur la faisabilité du moteur</a:t>
+            </a:r>
+            <a:endParaRPr b="0" lang="fr-FR" sz="4000" spc="-1" strike="noStrike">
+              <a:latin typeface="Arial"/>
+            </a:endParaRPr>
+          </a:p>
+        </p:txBody>
+      </p:sp>
+      <p:sp>
+        <p:nvSpPr>
+          <p:cNvPr id="138" name="CustomShape 2"/>
+          <p:cNvSpPr/>
+          <p:nvPr/>
+        </p:nvSpPr>
+        <p:spPr>
+          <a:xfrm>
+            <a:off x="1368000" y="2232000"/>
+            <a:ext cx="9717480" cy="3443760"/>
+          </a:xfrm>
+          <a:prstGeom prst="rect">
+            <a:avLst/>
+          </a:prstGeom>
+          <a:noFill/>
+          <a:ln>
+            <a:noFill/>
+          </a:ln>
+        </p:spPr>
+        <p:style>
+          <a:lnRef idx="0"/>
+          <a:fillRef idx="0"/>
+          <a:effectRef idx="0"/>
+          <a:fontRef idx="minor"/>
+        </p:style>
+        <p:txBody>
           <a:bodyPr lIns="90000" rIns="90000" tIns="45000" bIns="45000">
             <a:spAutoFit/>
           </a:bodyPr>
@@ -5219,67 +4948,81 @@
               </a:lnSpc>
             </a:pPr>
             <a:r>
-              <a:rPr b="0" lang="fr-FR" sz="1800" spc="-1" strike="noStrike">
+              <a:rPr b="0" lang="fr-FR" sz="2000" spc="-1" strike="noStrike">
                 <a:solidFill>
                   <a:srgbClr val="000000"/>
                 </a:solidFill>
                 <a:latin typeface="Arial"/>
                 <a:ea typeface="DejaVu Sans"/>
               </a:rPr>
-              <a:t>MATRICE DE CONFUSION</a:t>
+              <a:t>LA BONNE RÉPARTITION DES CLUSTERS INDUIT LA FAISABILITÉ DU MOTEUR DE CLASSIFICATION AUTOMATIQUE. TOUTEFOIS, LES RATIOS D’ÉVALUATION SONT TRÈS FAIBLES.</a:t>
             </a:r>
-            <a:endParaRPr b="0" lang="fr-FR" sz="1800" spc="-1" strike="noStrike">
-              <a:latin typeface="Arial"/>
-            </a:endParaRPr>
-          </a:p>
-        </p:txBody>
-      </p:sp>
-      <p:pic>
-        <p:nvPicPr>
-          <p:cNvPr id="147" name="" descr=""/>
-          <p:cNvPicPr/>
-          <p:nvPr/>
-        </p:nvPicPr>
-        <p:blipFill>
-          <a:blip r:embed="rId1"/>
-          <a:stretch/>
-        </p:blipFill>
-        <p:spPr>
-          <a:xfrm>
-            <a:off x="4968000" y="1190160"/>
-            <a:ext cx="5645880" cy="4855320"/>
-          </a:xfrm>
-          <a:prstGeom prst="rect">
-            <a:avLst/>
-          </a:prstGeom>
-          <a:ln>
-            <a:noFill/>
-          </a:ln>
-        </p:spPr>
-      </p:pic>
-      <p:pic>
-        <p:nvPicPr>
-          <p:cNvPr id="148" name="" descr=""/>
-          <p:cNvPicPr/>
-          <p:nvPr/>
-        </p:nvPicPr>
-        <p:blipFill>
-          <a:blip r:embed="rId2"/>
-          <a:stretch/>
-        </p:blipFill>
-        <p:spPr>
-          <a:xfrm>
-            <a:off x="866880" y="3528000"/>
-            <a:ext cx="4026600" cy="2255040"/>
-          </a:xfrm>
-          <a:prstGeom prst="rect">
-            <a:avLst/>
-          </a:prstGeom>
-          <a:ln>
-            <a:noFill/>
-          </a:ln>
-        </p:spPr>
-      </p:pic>
+            <a:endParaRPr b="0" lang="fr-FR" sz="2000" spc="-1" strike="noStrike">
+              <a:latin typeface="Arial"/>
+            </a:endParaRPr>
+          </a:p>
+          <a:p>
+            <a:pPr>
+              <a:lnSpc>
+                <a:spcPct val="100000"/>
+              </a:lnSpc>
+            </a:pPr>
+            <a:endParaRPr b="0" lang="fr-FR" sz="2000" spc="-1" strike="noStrike">
+              <a:latin typeface="Arial"/>
+            </a:endParaRPr>
+          </a:p>
+          <a:p>
+            <a:pPr>
+              <a:lnSpc>
+                <a:spcPct val="100000"/>
+              </a:lnSpc>
+            </a:pPr>
+            <a:r>
+              <a:rPr b="0" lang="fr-FR" sz="2000" spc="-1" strike="noStrike">
+                <a:solidFill>
+                  <a:srgbClr val="000000"/>
+                </a:solidFill>
+                <a:latin typeface="Arial"/>
+                <a:ea typeface="DejaVu Sans"/>
+              </a:rPr>
+              <a:t>EN EFFET, LA PRÉCISION ENTRE LES CLUSTERS IMAGE ET TEXTE EST DE 0,37.</a:t>
+            </a:r>
+            <a:endParaRPr b="0" lang="fr-FR" sz="2000" spc="-1" strike="noStrike">
+              <a:latin typeface="Arial"/>
+            </a:endParaRPr>
+          </a:p>
+          <a:p>
+            <a:pPr>
+              <a:lnSpc>
+                <a:spcPct val="100000"/>
+              </a:lnSpc>
+            </a:pPr>
+            <a:endParaRPr b="0" lang="fr-FR" sz="2000" spc="-1" strike="noStrike">
+              <a:latin typeface="Arial"/>
+            </a:endParaRPr>
+          </a:p>
+          <a:p>
+            <a:pPr>
+              <a:lnSpc>
+                <a:spcPct val="100000"/>
+              </a:lnSpc>
+            </a:pPr>
+            <a:r>
+              <a:rPr b="0" lang="fr-FR" sz="2000" spc="-1" strike="noStrike">
+                <a:solidFill>
+                  <a:srgbClr val="000000"/>
+                </a:solidFill>
+                <a:latin typeface="Arial"/>
+                <a:ea typeface="Microsoft YaHei"/>
+              </a:rPr>
+              <a:t>DES MÉTHODES AUTRES QUE LE SIFT (EXEMPLE CNN) SERAIENT A ENVISAGER POUR AMÉLIORER LES SCORES. PAR AILLEURS, LE NOMBRE CROISSANT D’ÉCHANTILLONS DEVRAIT PERMETTRE D’AMÉLIORER L’APPRENTISSAGE DU MODÈLE.</a:t>
+            </a:r>
+            <a:endParaRPr b="0" lang="fr-FR" sz="2000" spc="-1" strike="noStrike">
+              <a:latin typeface="Arial"/>
+            </a:endParaRPr>
+          </a:p>
+        </p:txBody>
+      </p:sp>
     </p:spTree>
   </p:cSld>
   <mc:AlternateContent>
@@ -5312,14 +5055,14 @@
       </p:grpSpPr>
       <p:sp>
         <p:nvSpPr>
-          <p:cNvPr id="149" name="CustomShape 1"/>
+          <p:cNvPr id="139" name="CustomShape 1"/>
           <p:cNvSpPr/>
           <p:nvPr/>
         </p:nvSpPr>
         <p:spPr>
           <a:xfrm>
-            <a:off x="1097280" y="879480"/>
-            <a:ext cx="10049400" cy="930960"/>
+            <a:off x="1097280" y="2108160"/>
+            <a:ext cx="10049040" cy="1311480"/>
           </a:xfrm>
           <a:prstGeom prst="rect">
             <a:avLst/>
@@ -5337,208 +5080,10 @@
         </p:style>
         <p:txBody>
           <a:bodyPr lIns="0" rIns="0" tIns="45000" bIns="45000">
-            <a:normAutofit fontScale="55000"/>
-          </a:bodyPr>
-          <a:p>
-            <a:pPr algn="ctr">
-              <a:lnSpc>
-                <a:spcPct val="110000"/>
-              </a:lnSpc>
-              <a:spcBef>
-                <a:spcPts val="1199"/>
-              </a:spcBef>
-              <a:spcAft>
-                <a:spcPts val="201"/>
-              </a:spcAft>
-            </a:pPr>
-            <a:r>
-              <a:rPr b="0" lang="fr-FR" sz="4000" spc="-1" strike="noStrike">
-                <a:solidFill>
-                  <a:srgbClr val="404040"/>
-                </a:solidFill>
-                <a:latin typeface="Franklin Gothic Book"/>
-                <a:ea typeface="DejaVu Sans"/>
-              </a:rPr>
-              <a:t>V – Conclusion et recommandation sur la faisabilité du moteur</a:t>
-            </a:r>
-            <a:endParaRPr b="0" lang="fr-FR" sz="4000" spc="-1" strike="noStrike">
-              <a:latin typeface="Arial"/>
-            </a:endParaRPr>
-          </a:p>
-        </p:txBody>
-      </p:sp>
-      <p:sp>
-        <p:nvSpPr>
-          <p:cNvPr id="150" name="CustomShape 2"/>
-          <p:cNvSpPr/>
-          <p:nvPr/>
-        </p:nvSpPr>
-        <p:spPr>
-          <a:xfrm>
-            <a:off x="1368000" y="2232000"/>
-            <a:ext cx="9717840" cy="3443760"/>
-          </a:xfrm>
-          <a:prstGeom prst="rect">
-            <a:avLst/>
-          </a:prstGeom>
-          <a:noFill/>
-          <a:ln>
-            <a:noFill/>
-          </a:ln>
-        </p:spPr>
-        <p:style>
-          <a:lnRef idx="0"/>
-          <a:fillRef idx="0"/>
-          <a:effectRef idx="0"/>
-          <a:fontRef idx="minor"/>
-        </p:style>
-        <p:txBody>
-          <a:bodyPr lIns="90000" rIns="90000" tIns="45000" bIns="45000">
-            <a:spAutoFit/>
-          </a:bodyPr>
-          <a:p>
-            <a:pPr>
-              <a:lnSpc>
-                <a:spcPct val="100000"/>
-              </a:lnSpc>
-            </a:pPr>
-            <a:r>
-              <a:rPr b="0" lang="fr-FR" sz="2000" spc="-1" strike="noStrike">
-                <a:solidFill>
-                  <a:srgbClr val="000000"/>
-                </a:solidFill>
-                <a:latin typeface="Arial"/>
-                <a:ea typeface="DejaVu Sans"/>
-              </a:rPr>
-              <a:t>LA BONNE RÉPARTITION DES CLUSTERS INDUIT LA FAISABILITÉ DU MOTEUR DE CLASSIFICATION AUTOMATIQUE. TOUTEFOIS, LES RATIOS D’ÉVALUATION SONT TRÈS FAIBLES.</a:t>
-            </a:r>
-            <a:endParaRPr b="0" lang="fr-FR" sz="2000" spc="-1" strike="noStrike">
-              <a:latin typeface="Arial"/>
-            </a:endParaRPr>
-          </a:p>
-          <a:p>
-            <a:pPr>
-              <a:lnSpc>
-                <a:spcPct val="100000"/>
-              </a:lnSpc>
-            </a:pPr>
-            <a:endParaRPr b="0" lang="fr-FR" sz="2000" spc="-1" strike="noStrike">
-              <a:latin typeface="Arial"/>
-            </a:endParaRPr>
-          </a:p>
-          <a:p>
-            <a:pPr>
-              <a:lnSpc>
-                <a:spcPct val="100000"/>
-              </a:lnSpc>
-            </a:pPr>
-            <a:r>
-              <a:rPr b="0" lang="fr-FR" sz="2000" spc="-1" strike="noStrike">
-                <a:solidFill>
-                  <a:srgbClr val="000000"/>
-                </a:solidFill>
-                <a:latin typeface="Arial"/>
-                <a:ea typeface="DejaVu Sans"/>
-              </a:rPr>
-              <a:t>EN EFFET, LA PRÉCISION ENTRE LES CLUSTERS IMAGE ET TEXTE EST DE 0,37.</a:t>
-            </a:r>
-            <a:endParaRPr b="0" lang="fr-FR" sz="2000" spc="-1" strike="noStrike">
-              <a:latin typeface="Arial"/>
-            </a:endParaRPr>
-          </a:p>
-          <a:p>
-            <a:pPr>
-              <a:lnSpc>
-                <a:spcPct val="100000"/>
-              </a:lnSpc>
-            </a:pPr>
-            <a:endParaRPr b="0" lang="fr-FR" sz="2000" spc="-1" strike="noStrike">
-              <a:latin typeface="Arial"/>
-            </a:endParaRPr>
-          </a:p>
-          <a:p>
-            <a:pPr>
-              <a:lnSpc>
-                <a:spcPct val="100000"/>
-              </a:lnSpc>
-            </a:pPr>
-            <a:r>
-              <a:rPr b="0" lang="fr-FR" sz="2000" spc="-1" strike="noStrike">
-                <a:solidFill>
-                  <a:srgbClr val="000000"/>
-                </a:solidFill>
-                <a:latin typeface="Arial"/>
-                <a:ea typeface="Microsoft YaHei"/>
-              </a:rPr>
-              <a:t>DES MÉTHODES AUTRES QUE LE SIFT (EXEMPLE CNN) SERAIENT A ENVISAGER POUR AMÉLIORER LES SCORES. PAR AILLEURS, LE NOMBRE CROISSANT D’ÉCHANTILLONS DEVRAIT PERMETTRE D’AMÉLIORER L’APPRENTISSAGE DU MODÈLE.</a:t>
-            </a:r>
-            <a:endParaRPr b="0" lang="fr-FR" sz="2000" spc="-1" strike="noStrike">
-              <a:latin typeface="Arial"/>
-            </a:endParaRPr>
-          </a:p>
-        </p:txBody>
-      </p:sp>
-    </p:spTree>
-  </p:cSld>
-  <mc:AlternateContent>
-    <mc:Choice Requires="p14">
-      <p:transition spd="slow" p14:dur="2000"/>
-    </mc:Choice>
-    <mc:Fallback>
-      <p:transition spd="slow"/>
-    </mc:Fallback>
-  </mc:AlternateContent>
-</p:sld>
-</file>
-
-<file path=ppt/slides/slide18.xml><?xml version="1.0" encoding="utf-8"?>
-<p:sld xmlns:a="http://schemas.openxmlformats.org/drawingml/2006/main" xmlns:p="http://schemas.openxmlformats.org/presentationml/2006/main" xmlns:r="http://schemas.openxmlformats.org/officeDocument/2006/relationships" xmlns:p14="http://schemas.microsoft.com/office/powerpoint/2010/main" xmlns:p15="http://schemas.microsoft.com/office/powerpoint/2012/main" xmlns:mc="http://schemas.openxmlformats.org/markup-compatibility/2006">
-  <p:cSld>
-    <p:spTree>
-      <p:nvGrpSpPr>
-        <p:cNvPr id="1" name=""/>
-        <p:cNvGrpSpPr/>
-        <p:nvPr/>
-      </p:nvGrpSpPr>
-      <p:grpSpPr>
-        <a:xfrm>
-          <a:off x="0" y="0"/>
-          <a:ext cx="0" cy="0"/>
-          <a:chOff x="0" y="0"/>
-          <a:chExt cx="0" cy="0"/>
-        </a:xfrm>
-      </p:grpSpPr>
-      <p:sp>
-        <p:nvSpPr>
-          <p:cNvPr id="151" name="CustomShape 1"/>
-          <p:cNvSpPr/>
-          <p:nvPr/>
-        </p:nvSpPr>
-        <p:spPr>
-          <a:xfrm>
-            <a:off x="1097280" y="2108160"/>
-            <a:ext cx="10049400" cy="1311840"/>
-          </a:xfrm>
-          <a:prstGeom prst="rect">
-            <a:avLst/>
-          </a:prstGeom>
-          <a:noFill/>
-          <a:ln>
-            <a:noFill/>
-          </a:ln>
-        </p:spPr>
-        <p:style>
-          <a:lnRef idx="0"/>
-          <a:fillRef idx="0"/>
-          <a:effectRef idx="0"/>
-          <a:fontRef idx="minor"/>
-        </p:style>
-        <p:txBody>
-          <a:bodyPr lIns="0" rIns="0" tIns="45000" bIns="45000">
             <a:normAutofit/>
           </a:bodyPr>
           <a:p>
-            <a:pPr marL="91440" indent="-82440" algn="ctr">
+            <a:pPr marL="91440" indent="-82080" algn="ctr">
               <a:lnSpc>
                 <a:spcPct val="110000"/>
               </a:lnSpc>
@@ -5572,14 +5117,14 @@
       </p:sp>
       <p:sp>
         <p:nvSpPr>
-          <p:cNvPr id="152" name="CustomShape 2"/>
+          <p:cNvPr id="140" name="CustomShape 2"/>
           <p:cNvSpPr/>
           <p:nvPr/>
         </p:nvSpPr>
         <p:spPr>
           <a:xfrm>
             <a:off x="8218440" y="6446880"/>
-            <a:ext cx="2575800" cy="356040"/>
+            <a:ext cx="2575440" cy="355680"/>
           </a:xfrm>
           <a:prstGeom prst="rect">
             <a:avLst/>
@@ -5605,7 +5150,7 @@
                 <a:spcPct val="100000"/>
               </a:lnSpc>
             </a:pPr>
-            <a:fld id="{C96D6AC3-9864-4235-A8D4-22496269D028}" type="datetime1">
+            <a:fld id="{9805B5F6-149A-4B35-AE48-9962C169D45A}" type="datetime1">
               <a:rPr b="0" lang="fr-FR" sz="800" spc="-1" strike="noStrike">
                 <a:solidFill>
                   <a:srgbClr val="ffffff"/>
@@ -5613,7 +5158,7 @@
                 <a:latin typeface="Franklin Gothic Book"/>
                 <a:ea typeface="DejaVu Sans"/>
               </a:rPr>
-              <a:t>09/03/2022</a:t>
+              <a:t>14/03/2022</a:t>
             </a:fld>
             <a:endParaRPr b="0" lang="fr-FR" sz="800" spc="-1" strike="noStrike">
               <a:latin typeface="Arial"/>
@@ -5667,7 +5212,7 @@
         <p:spPr>
           <a:xfrm>
             <a:off x="1440" y="0"/>
-            <a:ext cx="12183120" cy="6849000"/>
+            <a:ext cx="12182760" cy="6848640"/>
           </a:xfrm>
           <a:prstGeom prst="rect">
             <a:avLst/>
@@ -5703,7 +5248,7 @@
         <p:spPr>
           <a:xfrm>
             <a:off x="1097280" y="758880"/>
-            <a:ext cx="10049400" cy="3883320"/>
+            <a:ext cx="10049040" cy="3882960"/>
           </a:xfrm>
           <a:prstGeom prst="rect">
             <a:avLst/>
@@ -5839,7 +5384,7 @@
         <p:spPr>
           <a:xfrm>
             <a:off x="1440" y="4952880"/>
-            <a:ext cx="12179880" cy="1896120"/>
+            <a:ext cx="12179520" cy="1895760"/>
           </a:xfrm>
           <a:prstGeom prst="rect">
             <a:avLst/>
@@ -5905,7 +5450,7 @@
         <p:spPr>
           <a:xfrm>
             <a:off x="1092240" y="1993320"/>
-            <a:ext cx="10316880" cy="1186920"/>
+            <a:ext cx="10316520" cy="1186920"/>
           </a:xfrm>
           <a:prstGeom prst="rect">
             <a:avLst/>
@@ -5956,7 +5501,7 @@
         <p:spPr>
           <a:xfrm>
             <a:off x="1097280" y="915480"/>
-            <a:ext cx="10049400" cy="930960"/>
+            <a:ext cx="10049040" cy="930600"/>
           </a:xfrm>
           <a:prstGeom prst="rect">
             <a:avLst/>
@@ -6023,7 +5568,7 @@
         <p:spPr>
           <a:xfrm>
             <a:off x="1656000" y="3210120"/>
-            <a:ext cx="9215640" cy="2009880"/>
+            <a:ext cx="9215280" cy="2009880"/>
           </a:xfrm>
           <a:prstGeom prst="rect">
             <a:avLst/>
@@ -6074,7 +5619,7 @@
             </a:endParaRPr>
           </a:p>
           <a:p>
-            <a:pPr marL="285840" indent="-276840">
+            <a:pPr marL="285840" indent="-276480">
               <a:lnSpc>
                 <a:spcPct val="100000"/>
               </a:lnSpc>
@@ -6109,7 +5654,7 @@
             </a:endParaRPr>
           </a:p>
           <a:p>
-            <a:pPr marL="285840" indent="-276840">
+            <a:pPr marL="285840" indent="-276480">
               <a:lnSpc>
                 <a:spcPct val="100000"/>
               </a:lnSpc>
@@ -6144,7 +5689,7 @@
         <p:spPr>
           <a:xfrm>
             <a:off x="1188000" y="5220000"/>
-            <a:ext cx="10216440" cy="912960"/>
+            <a:ext cx="10216080" cy="912600"/>
           </a:xfrm>
           <a:prstGeom prst="rect">
             <a:avLst/>
@@ -6255,7 +5800,7 @@
         <p:spPr>
           <a:xfrm>
             <a:off x="1097280" y="915480"/>
-            <a:ext cx="10049400" cy="930960"/>
+            <a:ext cx="10049040" cy="930600"/>
           </a:xfrm>
           <a:prstGeom prst="rect">
             <a:avLst/>
@@ -6312,7 +5857,7 @@
         <p:spPr>
           <a:xfrm>
             <a:off x="1272240" y="2065320"/>
-            <a:ext cx="10172880" cy="6399000"/>
+            <a:ext cx="10172520" cy="3655800"/>
           </a:xfrm>
           <a:prstGeom prst="rect">
             <a:avLst/>
@@ -6332,6 +5877,31 @@
           <a:bodyPr lIns="90000" rIns="90000" tIns="45000" bIns="45000">
             <a:spAutoFit/>
           </a:bodyPr>
+          <a:p>
+            <a:pPr marL="216000" indent="-216000">
+              <a:lnSpc>
+                <a:spcPct val="100000"/>
+              </a:lnSpc>
+              <a:buClr>
+                <a:srgbClr val="000000"/>
+              </a:buClr>
+              <a:buFont typeface="Wingdings" charset="2"/>
+              <a:buChar char=""/>
+            </a:pPr>
+            <a:r>
+              <a:rPr b="0" lang="fr-FR" sz="1800" spc="-1" strike="noStrike">
+                <a:solidFill>
+                  <a:srgbClr val="000000"/>
+                </a:solidFill>
+                <a:latin typeface="Franklin Gothic Book"/>
+                <a:ea typeface="DejaVu Sans"/>
+              </a:rPr>
+              <a:t>Un échantillon de 8 bases de données (fichiers csv) contenant </a:t>
+            </a:r>
+            <a:endParaRPr b="0" lang="fr-FR" sz="1800" spc="-1" strike="noStrike">
+              <a:latin typeface="Arial"/>
+            </a:endParaRPr>
+          </a:p>
           <a:p>
             <a:pPr>
               <a:lnSpc>
@@ -6346,18 +5916,18 @@
                 <a:latin typeface="Franklin Gothic Book"/>
                 <a:ea typeface="DejaVu Sans"/>
               </a:rPr>
-              <a:t>Il s’agit d’un échantillon de 8 bases de données (fichiers csv) contenant des informations sur plus de 300 K individus labellisés et environ 50 K non labellisés. Nombre des variables ont une quantité significative de valeurs manquantes et aberrantes.</a:t>
+              <a:t>	</a:t>
             </a:r>
-            <a:endParaRPr b="0" lang="fr-FR" sz="1800" spc="-1" strike="noStrike">
-              <a:latin typeface="Arial"/>
-            </a:endParaRPr>
-          </a:p>
-          <a:p>
-            <a:pPr>
-              <a:lnSpc>
-                <a:spcPct val="100000"/>
-              </a:lnSpc>
-            </a:pPr>
+            <a:r>
+              <a:rPr b="0" lang="fr-FR" sz="1800" spc="-1" strike="noStrike">
+                <a:solidFill>
+                  <a:srgbClr val="000000"/>
+                </a:solidFill>
+                <a:latin typeface="Franklin Gothic Book"/>
+                <a:ea typeface="DejaVu Sans"/>
+              </a:rPr>
+              <a:t>- des informations sur plus de 300 K individus labellisés </a:t>
+            </a:r>
             <a:endParaRPr b="0" lang="fr-FR" sz="1800" spc="-1" strike="noStrike">
               <a:latin typeface="Arial"/>
             </a:endParaRPr>
@@ -6376,7 +5946,17 @@
                 <a:latin typeface="Franklin Gothic Book"/>
                 <a:ea typeface="DejaVu Sans"/>
               </a:rPr>
-              <a:t>Par ailleurs, le jeu de données est très déséquilibré avec une proportion 95 % - 5 % dans la variable cible.</a:t>
+              <a:t>	</a:t>
+            </a:r>
+            <a:r>
+              <a:rPr b="0" lang="fr-FR" sz="1800" spc="-1" strike="noStrike">
+                <a:solidFill>
+                  <a:srgbClr val="000000"/>
+                </a:solidFill>
+                <a:latin typeface="Franklin Gothic Book"/>
+                <a:ea typeface="DejaVu Sans"/>
+              </a:rPr>
+              <a:t>- environ 50 K non labellisés. </a:t>
             </a:r>
             <a:endParaRPr b="0" lang="fr-FR" sz="1800" spc="-1" strike="noStrike">
               <a:latin typeface="Arial"/>
@@ -6403,20 +5983,15 @@
             </a:endParaRPr>
           </a:p>
           <a:p>
-            <a:pPr>
+            <a:pPr marL="216000" indent="-216000">
               <a:lnSpc>
                 <a:spcPct val="100000"/>
               </a:lnSpc>
-            </a:pPr>
-            <a:endParaRPr b="0" lang="fr-FR" sz="1800" spc="-1" strike="noStrike">
-              <a:latin typeface="Arial"/>
-            </a:endParaRPr>
-          </a:p>
-          <a:p>
-            <a:pPr>
-              <a:lnSpc>
-                <a:spcPct val="100000"/>
-              </a:lnSpc>
+              <a:buClr>
+                <a:srgbClr val="000000"/>
+              </a:buClr>
+              <a:buFont typeface="Wingdings" charset="2"/>
+              <a:buChar char=""/>
             </a:pPr>
             <a:r>
               <a:rPr b="0" lang="fr-FR" sz="1800" spc="-1" strike="noStrike">
@@ -6426,17 +6001,23 @@
                 <a:latin typeface="Franklin Gothic Book"/>
                 <a:ea typeface="DejaVu Sans"/>
               </a:rPr>
-              <a:t>100646</a:t>
+              <a:t>Un nombre des variables ont une quantité significative de valeurs manquantes et aberrantes.</a:t>
             </a:r>
             <a:endParaRPr b="0" lang="fr-FR" sz="1800" spc="-1" strike="noStrike">
               <a:latin typeface="Arial"/>
             </a:endParaRPr>
           </a:p>
           <a:p>
-            <a:pPr>
+            <a:pPr lvl="1" marL="432000" indent="-216000">
               <a:lnSpc>
                 <a:spcPct val="100000"/>
               </a:lnSpc>
+              <a:buClr>
+                <a:srgbClr val="000000"/>
+              </a:buClr>
+              <a:buSzPct val="45000"/>
+              <a:buFont typeface="Wingdings" charset="2"/>
+              <a:buChar char=""/>
             </a:pPr>
             <a:r>
               <a:rPr b="0" lang="fr-FR" sz="1800" spc="-1" strike="noStrike">
@@ -6446,127 +6027,23 @@
                 <a:latin typeface="Franklin Gothic Book"/>
                 <a:ea typeface="DejaVu Sans"/>
               </a:rPr>
-              <a:t>100011</a:t>
+              <a:t>- Agrégation de tableau</a:t>
             </a:r>
             <a:endParaRPr b="0" lang="fr-FR" sz="1800" spc="-1" strike="noStrike">
               <a:latin typeface="Arial"/>
             </a:endParaRPr>
           </a:p>
           <a:p>
-            <a:pPr>
+            <a:pPr lvl="1" marL="432000" indent="-216000">
               <a:lnSpc>
                 <a:spcPct val="100000"/>
               </a:lnSpc>
-            </a:pPr>
-            <a:endParaRPr b="0" lang="fr-FR" sz="1800" spc="-1" strike="noStrike">
-              <a:latin typeface="Arial"/>
-            </a:endParaRPr>
-          </a:p>
-          <a:p>
-            <a:pPr>
-              <a:lnSpc>
-                <a:spcPct val="100000"/>
-              </a:lnSpc>
-            </a:pPr>
-            <a:endParaRPr b="0" lang="fr-FR" sz="1800" spc="-1" strike="noStrike">
-              <a:latin typeface="Arial"/>
-            </a:endParaRPr>
-          </a:p>
-          <a:p>
-            <a:pPr>
-              <a:lnSpc>
-                <a:spcPct val="100000"/>
-              </a:lnSpc>
-            </a:pPr>
-            <a:endParaRPr b="0" lang="fr-FR" sz="1800" spc="-1" strike="noStrike">
-              <a:latin typeface="Arial"/>
-            </a:endParaRPr>
-          </a:p>
-          <a:p>
-            <a:pPr>
-              <a:lnSpc>
-                <a:spcPct val="100000"/>
-              </a:lnSpc>
-            </a:pPr>
-            <a:endParaRPr b="0" lang="fr-FR" sz="1800" spc="-1" strike="noStrike">
-              <a:latin typeface="Arial"/>
-            </a:endParaRPr>
-          </a:p>
-          <a:p>
-            <a:pPr>
-              <a:lnSpc>
-                <a:spcPct val="100000"/>
-              </a:lnSpc>
-            </a:pPr>
-            <a:endParaRPr b="0" lang="fr-FR" sz="1800" spc="-1" strike="noStrike">
-              <a:latin typeface="Arial"/>
-            </a:endParaRPr>
-          </a:p>
-          <a:p>
-            <a:pPr>
-              <a:lnSpc>
-                <a:spcPct val="100000"/>
-              </a:lnSpc>
-            </a:pPr>
-            <a:endParaRPr b="0" lang="fr-FR" sz="1800" spc="-1" strike="noStrike">
-              <a:latin typeface="Arial"/>
-            </a:endParaRPr>
-          </a:p>
-          <a:p>
-            <a:pPr>
-              <a:lnSpc>
-                <a:spcPct val="100000"/>
-              </a:lnSpc>
-            </a:pPr>
-            <a:endParaRPr b="0" lang="fr-FR" sz="1800" spc="-1" strike="noStrike">
-              <a:latin typeface="Arial"/>
-            </a:endParaRPr>
-          </a:p>
-          <a:p>
-            <a:pPr>
-              <a:lnSpc>
-                <a:spcPct val="100000"/>
-              </a:lnSpc>
-            </a:pPr>
-            <a:endParaRPr b="0" lang="fr-FR" sz="1800" spc="-1" strike="noStrike">
-              <a:latin typeface="Arial"/>
-            </a:endParaRPr>
-          </a:p>
-          <a:p>
-            <a:pPr>
-              <a:lnSpc>
-                <a:spcPct val="100000"/>
-              </a:lnSpc>
-            </a:pPr>
-            <a:endParaRPr b="0" lang="fr-FR" sz="1800" spc="-1" strike="noStrike">
-              <a:latin typeface="Arial"/>
-            </a:endParaRPr>
-          </a:p>
-          <a:p>
-            <a:pPr>
-              <a:lnSpc>
-                <a:spcPct val="100000"/>
-              </a:lnSpc>
-            </a:pPr>
-            <a:endParaRPr b="0" lang="fr-FR" sz="1800" spc="-1" strike="noStrike">
-              <a:latin typeface="Arial"/>
-            </a:endParaRPr>
-          </a:p>
-          <a:p>
-            <a:pPr>
-              <a:lnSpc>
-                <a:spcPct val="100000"/>
-              </a:lnSpc>
-            </a:pPr>
-            <a:endParaRPr b="0" lang="fr-FR" sz="1800" spc="-1" strike="noStrike">
-              <a:latin typeface="Arial"/>
-            </a:endParaRPr>
-          </a:p>
-          <a:p>
-            <a:pPr>
-              <a:lnSpc>
-                <a:spcPct val="100000"/>
-              </a:lnSpc>
+              <a:buClr>
+                <a:srgbClr val="000000"/>
+              </a:buClr>
+              <a:buSzPct val="45000"/>
+              <a:buFont typeface="Wingdings" charset="2"/>
+              <a:buChar char=""/>
             </a:pPr>
             <a:r>
               <a:rPr b="0" lang="fr-FR" sz="1800" spc="-1" strike="noStrike">
@@ -6576,8 +6053,89 @@
                 <a:latin typeface="Franklin Gothic Book"/>
                 <a:ea typeface="DejaVu Sans"/>
               </a:rPr>
-              <a:t>Une bonne qualité des données avec quasiment pas de valeurs manquantes.</a:t>
+              <a:t>- Remplissage en fonction de la typologie de variable (Mode vs Moyenne)</a:t>
             </a:r>
+            <a:endParaRPr b="0" lang="fr-FR" sz="1800" spc="-1" strike="noStrike">
+              <a:latin typeface="Arial"/>
+            </a:endParaRPr>
+          </a:p>
+          <a:p>
+            <a:pPr>
+              <a:lnSpc>
+                <a:spcPct val="100000"/>
+              </a:lnSpc>
+            </a:pPr>
+            <a:endParaRPr b="0" lang="fr-FR" sz="1800" spc="-1" strike="noStrike">
+              <a:latin typeface="Arial"/>
+            </a:endParaRPr>
+          </a:p>
+          <a:p>
+            <a:pPr marL="216000" indent="-216000">
+              <a:lnSpc>
+                <a:spcPct val="100000"/>
+              </a:lnSpc>
+              <a:buClr>
+                <a:srgbClr val="000000"/>
+              </a:buClr>
+              <a:buFont typeface="Wingdings" charset="2"/>
+              <a:buChar char=""/>
+            </a:pPr>
+            <a:r>
+              <a:rPr b="0" lang="fr-FR" sz="1800" spc="-1" strike="noStrike">
+                <a:solidFill>
+                  <a:srgbClr val="000000"/>
+                </a:solidFill>
+                <a:latin typeface="Franklin Gothic Book"/>
+                <a:ea typeface="DejaVu Sans"/>
+              </a:rPr>
+              <a:t>Un jeu de données est très déséquilibré avec une proportion 95 % - 5 % dans la variable cible.</a:t>
+            </a:r>
+            <a:endParaRPr b="0" lang="fr-FR" sz="1800" spc="-1" strike="noStrike">
+              <a:latin typeface="Arial"/>
+            </a:endParaRPr>
+          </a:p>
+          <a:p>
+            <a:pPr lvl="1" marL="432000" indent="-216000">
+              <a:lnSpc>
+                <a:spcPct val="100000"/>
+              </a:lnSpc>
+              <a:buClr>
+                <a:srgbClr val="000000"/>
+              </a:buClr>
+              <a:buSzPct val="45000"/>
+              <a:buFont typeface="Wingdings" charset="2"/>
+              <a:buChar char=""/>
+            </a:pPr>
+            <a:r>
+              <a:rPr b="0" lang="fr-FR" sz="1800" spc="-1" strike="noStrike">
+                <a:solidFill>
+                  <a:srgbClr val="000000"/>
+                </a:solidFill>
+                <a:latin typeface="Franklin Gothic Book"/>
+                <a:ea typeface="DejaVu Sans"/>
+              </a:rPr>
+              <a:t>- Rééquilibrage des données par SMOTE</a:t>
+            </a:r>
+            <a:endParaRPr b="0" lang="fr-FR" sz="1800" spc="-1" strike="noStrike">
+              <a:latin typeface="Arial"/>
+            </a:endParaRPr>
+          </a:p>
+          <a:p>
+            <a:pPr>
+              <a:lnSpc>
+                <a:spcPct val="100000"/>
+              </a:lnSpc>
+            </a:pPr>
+            <a:endParaRPr b="0" lang="fr-FR" sz="1800" spc="-1" strike="noStrike">
+              <a:latin typeface="Arial"/>
+            </a:endParaRPr>
+          </a:p>
+          <a:p>
+            <a:pPr>
+              <a:lnSpc>
+                <a:spcPct val="100000"/>
+              </a:lnSpc>
+            </a:pPr>
             <a:endParaRPr b="0" lang="fr-FR" sz="1800" spc="-1" strike="noStrike">
               <a:latin typeface="Arial"/>
             </a:endParaRPr>
@@ -6614,9 +6172,66 @@
           <a:chExt cx="0" cy="0"/>
         </a:xfrm>
       </p:grpSpPr>
+      <p:sp>
+        <p:nvSpPr>
+          <p:cNvPr id="99" name="CustomShape 1"/>
+          <p:cNvSpPr/>
+          <p:nvPr/>
+        </p:nvSpPr>
+        <p:spPr>
+          <a:xfrm>
+            <a:off x="1097280" y="915480"/>
+            <a:ext cx="10049040" cy="930600"/>
+          </a:xfrm>
+          <a:prstGeom prst="rect">
+            <a:avLst/>
+          </a:prstGeom>
+          <a:noFill/>
+          <a:ln>
+            <a:noFill/>
+          </a:ln>
+        </p:spPr>
+        <p:style>
+          <a:lnRef idx="0"/>
+          <a:fillRef idx="0"/>
+          <a:effectRef idx="0"/>
+          <a:fontRef idx="minor"/>
+        </p:style>
+        <p:txBody>
+          <a:bodyPr lIns="0" rIns="0" tIns="45000" bIns="45000">
+            <a:normAutofit/>
+          </a:bodyPr>
+          <a:p>
+            <a:pPr algn="ctr">
+              <a:lnSpc>
+                <a:spcPct val="110000"/>
+              </a:lnSpc>
+              <a:spcBef>
+                <a:spcPts val="1199"/>
+              </a:spcBef>
+              <a:spcAft>
+                <a:spcPts val="201"/>
+              </a:spcAft>
+            </a:pPr>
+            <a:r>
+              <a:rPr b="0" lang="fr-FR" sz="4000" spc="-1" strike="noStrike">
+                <a:solidFill>
+                  <a:srgbClr val="404040"/>
+                </a:solidFill>
+                <a:latin typeface="Franklin Gothic Book"/>
+                <a:ea typeface="DejaVu Sans"/>
+              </a:rPr>
+              <a:t>Quelques analyses</a:t>
+            </a:r>
+            <a:endParaRPr b="0" lang="fr-FR" sz="4000" spc="-1" strike="noStrike">
+              <a:latin typeface="Arial"/>
+            </a:endParaRPr>
+          </a:p>
+        </p:txBody>
+      </p:sp>
       <p:pic>
         <p:nvPicPr>
-          <p:cNvPr id="99" name="" descr=""/>
+          <p:cNvPr id="100" name="" descr=""/>
           <p:cNvPicPr/>
           <p:nvPr/>
         </p:nvPicPr>
@@ -6626,8 +6241,54 @@
         </p:blipFill>
         <p:spPr>
           <a:xfrm>
-            <a:off x="431280" y="742680"/>
-            <a:ext cx="11342880" cy="5380200"/>
+            <a:off x="576000" y="2088000"/>
+            <a:ext cx="3133800" cy="3571920"/>
+          </a:xfrm>
+          <a:prstGeom prst="rect">
+            <a:avLst/>
+          </a:prstGeom>
+          <a:ln>
+            <a:noFill/>
+          </a:ln>
+        </p:spPr>
+      </p:pic>
+      <p:pic>
+        <p:nvPicPr>
+          <p:cNvPr id="101" name="" descr=""/>
+          <p:cNvPicPr/>
+          <p:nvPr/>
+        </p:nvPicPr>
+        <p:blipFill>
+          <a:blip r:embed="rId2"/>
+          <a:stretch/>
+        </p:blipFill>
+        <p:spPr>
+          <a:xfrm>
+            <a:off x="3528000" y="2059560"/>
+            <a:ext cx="3456000" cy="3600360"/>
+          </a:xfrm>
+          <a:prstGeom prst="rect">
+            <a:avLst/>
+          </a:prstGeom>
+          <a:ln>
+            <a:noFill/>
+          </a:ln>
+        </p:spPr>
+      </p:pic>
+      <p:pic>
+        <p:nvPicPr>
+          <p:cNvPr id="102" name="" descr=""/>
+          <p:cNvPicPr/>
+          <p:nvPr/>
+        </p:nvPicPr>
+        <p:blipFill>
+          <a:blip r:embed="rId3"/>
+          <a:stretch/>
+        </p:blipFill>
+        <p:spPr>
+          <a:xfrm>
+            <a:off x="7128000" y="1944000"/>
+            <a:ext cx="4464000" cy="3438360"/>
           </a:xfrm>
           <a:prstGeom prst="rect">
             <a:avLst/>
@@ -6667,9 +6328,287 @@
           <a:chExt cx="0" cy="0"/>
         </a:xfrm>
       </p:grpSpPr>
+      <p:sp>
+        <p:nvSpPr>
+          <p:cNvPr id="103" name="CustomShape 1"/>
+          <p:cNvSpPr/>
+          <p:nvPr/>
+        </p:nvSpPr>
+        <p:spPr>
+          <a:xfrm>
+            <a:off x="1097280" y="915480"/>
+            <a:ext cx="10049040" cy="930600"/>
+          </a:xfrm>
+          <a:prstGeom prst="rect">
+            <a:avLst/>
+          </a:prstGeom>
+          <a:noFill/>
+          <a:ln>
+            <a:noFill/>
+          </a:ln>
+        </p:spPr>
+        <p:style>
+          <a:lnRef idx="0"/>
+          <a:fillRef idx="0"/>
+          <a:effectRef idx="0"/>
+          <a:fontRef idx="minor"/>
+        </p:style>
+        <p:txBody>
+          <a:bodyPr lIns="0" rIns="0" tIns="45000" bIns="45000">
+            <a:normAutofit/>
+          </a:bodyPr>
+          <a:p>
+            <a:pPr algn="ctr">
+              <a:lnSpc>
+                <a:spcPct val="110000"/>
+              </a:lnSpc>
+              <a:spcBef>
+                <a:spcPts val="1199"/>
+              </a:spcBef>
+              <a:spcAft>
+                <a:spcPts val="201"/>
+              </a:spcAft>
+            </a:pPr>
+            <a:r>
+              <a:rPr b="0" lang="fr-FR" sz="4000" spc="-1" strike="noStrike">
+                <a:latin typeface="Franklin Gothic Book"/>
+                <a:ea typeface="DejaVu Sans"/>
+              </a:rPr>
+              <a:t>III – Entrainements de modèles</a:t>
+            </a:r>
+            <a:endParaRPr b="0" lang="fr-FR" sz="4000" spc="-1" strike="noStrike">
+              <a:latin typeface="Arial"/>
+            </a:endParaRPr>
+          </a:p>
+        </p:txBody>
+      </p:sp>
+      <p:sp>
+        <p:nvSpPr>
+          <p:cNvPr id="104" name="CustomShape 2"/>
+          <p:cNvSpPr/>
+          <p:nvPr/>
+        </p:nvSpPr>
+        <p:spPr>
+          <a:xfrm>
+            <a:off x="2052000" y="2808000"/>
+            <a:ext cx="4572000" cy="364680"/>
+          </a:xfrm>
+          <a:prstGeom prst="rect">
+            <a:avLst/>
+          </a:prstGeom>
+          <a:noFill/>
+          <a:ln>
+            <a:noFill/>
+          </a:ln>
+        </p:spPr>
+        <p:style>
+          <a:lnRef idx="0"/>
+          <a:fillRef idx="0"/>
+          <a:effectRef idx="0"/>
+          <a:fontRef idx="minor"/>
+        </p:style>
+        <p:txBody>
+          <a:bodyPr lIns="90000" rIns="90000" tIns="45000" bIns="45000">
+            <a:spAutoFit/>
+          </a:bodyPr>
+          <a:p>
+            <a:pPr>
+              <a:lnSpc>
+                <a:spcPct val="100000"/>
+              </a:lnSpc>
+            </a:pPr>
+            <a:r>
+              <a:rPr b="0" i="1" lang="fr-FR" sz="1800" spc="-1" strike="noStrike">
+                <a:solidFill>
+                  <a:srgbClr val="000000"/>
+                </a:solidFill>
+                <a:latin typeface="Franklin Gothic Book"/>
+                <a:ea typeface="DejaVu Sans"/>
+              </a:rPr>
+              <a:t>- Déséquilibre 95 % - 5 %                             </a:t>
+            </a:r>
+            <a:endParaRPr b="0" lang="fr-FR" sz="1800" spc="-1" strike="noStrike">
+              <a:latin typeface="Arial"/>
+            </a:endParaRPr>
+          </a:p>
+        </p:txBody>
+      </p:sp>
+      <p:sp>
+        <p:nvSpPr>
+          <p:cNvPr id="105" name="CustomShape 3"/>
+          <p:cNvSpPr/>
+          <p:nvPr/>
+        </p:nvSpPr>
+        <p:spPr>
+          <a:xfrm>
+            <a:off x="1476000" y="2160000"/>
+            <a:ext cx="9396000" cy="364680"/>
+          </a:xfrm>
+          <a:prstGeom prst="rect">
+            <a:avLst/>
+          </a:prstGeom>
+          <a:noFill/>
+          <a:ln>
+            <a:noFill/>
+          </a:ln>
+        </p:spPr>
+        <p:style>
+          <a:lnRef idx="0"/>
+          <a:fillRef idx="0"/>
+          <a:effectRef idx="0"/>
+          <a:fontRef idx="minor"/>
+        </p:style>
+        <p:txBody>
+          <a:bodyPr lIns="90000" rIns="90000" tIns="45000" bIns="45000">
+            <a:spAutoFit/>
+          </a:bodyPr>
+          <a:p>
+            <a:pPr>
+              <a:lnSpc>
+                <a:spcPct val="100000"/>
+              </a:lnSpc>
+            </a:pPr>
+            <a:r>
+              <a:rPr b="1" lang="fr-FR" sz="1800" spc="-1" strike="noStrike">
+                <a:solidFill>
+                  <a:srgbClr val="000000"/>
+                </a:solidFill>
+                <a:latin typeface="Franklin Gothic Book"/>
+                <a:ea typeface="DejaVu Sans"/>
+              </a:rPr>
+              <a:t>Définition de la baseline modèle</a:t>
+            </a:r>
+            <a:endParaRPr b="0" lang="fr-FR" sz="1800" spc="-1" strike="noStrike">
+              <a:latin typeface="Arial"/>
+            </a:endParaRPr>
+          </a:p>
+        </p:txBody>
+      </p:sp>
+      <p:sp>
+        <p:nvSpPr>
+          <p:cNvPr id="106" name="CustomShape 4"/>
+          <p:cNvSpPr/>
+          <p:nvPr/>
+        </p:nvSpPr>
+        <p:spPr>
+          <a:xfrm>
+            <a:off x="5976360" y="4536360"/>
+            <a:ext cx="792000" cy="360000"/>
+          </a:xfrm>
+          <a:custGeom>
+            <a:avLst/>
+            <a:gdLst/>
+            <a:ahLst/>
+            <a:rect l="0" t="0" r="r" b="b"/>
+            <a:pathLst>
+              <a:path w="2202" h="1002">
+                <a:moveTo>
+                  <a:pt x="0" y="250"/>
+                </a:moveTo>
+                <a:lnTo>
+                  <a:pt x="1650" y="250"/>
+                </a:lnTo>
+                <a:lnTo>
+                  <a:pt x="1650" y="0"/>
+                </a:lnTo>
+                <a:lnTo>
+                  <a:pt x="2201" y="500"/>
+                </a:lnTo>
+                <a:lnTo>
+                  <a:pt x="1650" y="1001"/>
+                </a:lnTo>
+                <a:lnTo>
+                  <a:pt x="1650" y="750"/>
+                </a:lnTo>
+                <a:lnTo>
+                  <a:pt x="0" y="750"/>
+                </a:lnTo>
+                <a:lnTo>
+                  <a:pt x="0" y="250"/>
+                </a:lnTo>
+              </a:path>
+            </a:pathLst>
+          </a:custGeom>
+          <a:solidFill>
+            <a:srgbClr val="808080"/>
+          </a:solidFill>
+          <a:ln>
+            <a:solidFill>
+              <a:srgbClr val="3465a4"/>
+            </a:solidFill>
+          </a:ln>
+        </p:spPr>
+        <p:style>
+          <a:lnRef idx="0"/>
+          <a:fillRef idx="0"/>
+          <a:effectRef idx="0"/>
+          <a:fontRef idx="minor"/>
+        </p:style>
+      </p:sp>
+      <p:sp>
+        <p:nvSpPr>
+          <p:cNvPr id="107" name="CustomShape 5"/>
+          <p:cNvSpPr/>
+          <p:nvPr/>
+        </p:nvSpPr>
+        <p:spPr>
+          <a:xfrm>
+            <a:off x="6408000" y="4248000"/>
+            <a:ext cx="4464000" cy="639000"/>
+          </a:xfrm>
+          <a:prstGeom prst="rect">
+            <a:avLst/>
+          </a:prstGeom>
+          <a:noFill/>
+          <a:ln>
+            <a:noFill/>
+          </a:ln>
+        </p:spPr>
+        <p:style>
+          <a:lnRef idx="0"/>
+          <a:fillRef idx="0"/>
+          <a:effectRef idx="0"/>
+          <a:fontRef idx="minor"/>
+        </p:style>
+        <p:txBody>
+          <a:bodyPr lIns="90000" rIns="90000" tIns="45000" bIns="45000">
+            <a:spAutoFit/>
+          </a:bodyPr>
+          <a:p>
+            <a:pPr>
+              <a:lnSpc>
+                <a:spcPct val="100000"/>
+              </a:lnSpc>
+            </a:pPr>
+            <a:r>
+              <a:rPr b="0" i="1" lang="fr-FR" sz="1800" spc="-1" strike="noStrike">
+                <a:solidFill>
+                  <a:srgbClr val="000000"/>
+                </a:solidFill>
+                <a:latin typeface="Franklin Gothic Book"/>
+                <a:ea typeface="DejaVu Sans"/>
+              </a:rPr>
+              <a:t>                                                                                    </a:t>
+            </a:r>
+            <a:r>
+              <a:rPr b="0" i="1" lang="fr-FR" sz="1800" spc="-1" strike="noStrike">
+                <a:solidFill>
+                  <a:srgbClr val="000000"/>
+                </a:solidFill>
+                <a:latin typeface="Franklin Gothic Book"/>
+                <a:ea typeface="DejaVu Sans"/>
+              </a:rPr>
+              <a:t>Utilisation SMOTE 50 % - 50 %</a:t>
+            </a:r>
+            <a:endParaRPr b="0" lang="fr-FR" sz="1800" spc="-1" strike="noStrike">
+              <a:latin typeface="Arial"/>
+            </a:endParaRPr>
+          </a:p>
+        </p:txBody>
+      </p:sp>
       <p:pic>
         <p:nvPicPr>
-          <p:cNvPr id="100" name="" descr=""/>
+          <p:cNvPr id="108" name="" descr=""/>
           <p:cNvPicPr/>
           <p:nvPr/>
         </p:nvPicPr>
@@ -6679,31 +6618,8 @@
         </p:blipFill>
         <p:spPr>
           <a:xfrm>
-            <a:off x="936000" y="864000"/>
-            <a:ext cx="4678560" cy="5421240"/>
-          </a:xfrm>
-          <a:prstGeom prst="rect">
-            <a:avLst/>
-          </a:prstGeom>
-          <a:ln>
-            <a:noFill/>
-          </a:ln>
-        </p:spPr>
-      </p:pic>
-      <p:pic>
-        <p:nvPicPr>
-          <p:cNvPr id="101" name="" descr=""/>
-          <p:cNvPicPr/>
-          <p:nvPr/>
-        </p:nvPicPr>
-        <p:blipFill>
-          <a:blip r:embed="rId2"/>
-          <a:stretch/>
-        </p:blipFill>
-        <p:spPr>
-          <a:xfrm>
-            <a:off x="7524000" y="822240"/>
-            <a:ext cx="3256560" cy="4814280"/>
+            <a:off x="1800000" y="3384000"/>
+            <a:ext cx="3240000" cy="2958840"/>
           </a:xfrm>
           <a:prstGeom prst="rect">
             <a:avLst/>
@@ -6745,14 +6661,14 @@
       </p:grpSpPr>
       <p:sp>
         <p:nvSpPr>
-          <p:cNvPr id="102" name="CustomShape 1"/>
+          <p:cNvPr id="109" name="CustomShape 1"/>
           <p:cNvSpPr/>
           <p:nvPr/>
         </p:nvSpPr>
         <p:spPr>
           <a:xfrm>
-            <a:off x="1097280" y="915480"/>
-            <a:ext cx="10049400" cy="930960"/>
+            <a:off x="1335240" y="5904000"/>
+            <a:ext cx="9104760" cy="364680"/>
           </a:xfrm>
           <a:prstGeom prst="rect">
             <a:avLst/>
@@ -6769,68 +6685,11 @@
           <a:fontRef idx="minor"/>
         </p:style>
         <p:txBody>
-          <a:bodyPr lIns="0" rIns="0" tIns="45000" bIns="45000">
-            <a:normAutofit/>
-          </a:bodyPr>
-          <a:p>
-            <a:pPr algn="ctr">
-              <a:lnSpc>
-                <a:spcPct val="110000"/>
-              </a:lnSpc>
-              <a:spcBef>
-                <a:spcPts val="1199"/>
-              </a:spcBef>
-              <a:spcAft>
-                <a:spcPts val="201"/>
-              </a:spcAft>
-            </a:pPr>
-            <a:r>
-              <a:rPr b="0" lang="fr-FR" sz="4000" spc="-1" strike="noStrike">
-                <a:solidFill>
-                  <a:srgbClr val="404040"/>
-                </a:solidFill>
-                <a:latin typeface="Franklin Gothic Book"/>
-                <a:ea typeface="DejaVu Sans"/>
-              </a:rPr>
-              <a:t>III – Explication des pré-traitements</a:t>
-            </a:r>
-            <a:endParaRPr b="0" lang="fr-FR" sz="4000" spc="-1" strike="noStrike">
-              <a:latin typeface="Arial"/>
-            </a:endParaRPr>
-          </a:p>
-        </p:txBody>
-      </p:sp>
-      <p:sp>
-        <p:nvSpPr>
-          <p:cNvPr id="103" name="CustomShape 2"/>
-          <p:cNvSpPr/>
-          <p:nvPr/>
-        </p:nvSpPr>
-        <p:spPr>
-          <a:xfrm>
-            <a:off x="2052000" y="2952000"/>
-            <a:ext cx="9105120" cy="2558520"/>
-          </a:xfrm>
-          <a:prstGeom prst="rect">
-            <a:avLst/>
-          </a:prstGeom>
-          <a:noFill/>
-          <a:ln>
-            <a:noFill/>
-          </a:ln>
-        </p:spPr>
-        <p:style>
-          <a:lnRef idx="0"/>
-          <a:fillRef idx="0"/>
-          <a:effectRef idx="0"/>
-          <a:fontRef idx="minor"/>
-        </p:style>
-        <p:txBody>
           <a:bodyPr lIns="90000" rIns="90000" tIns="45000" bIns="45000">
             <a:spAutoFit/>
           </a:bodyPr>
           <a:p>
-            <a:pPr>
+            <a:pPr algn="ctr">
               <a:lnSpc>
                 <a:spcPct val="100000"/>
               </a:lnSpc>
@@ -6843,144 +6702,24 @@
                 <a:latin typeface="Franklin Gothic Book"/>
                 <a:ea typeface="DejaVu Sans"/>
               </a:rPr>
-              <a:t>- Purge des ponctuations</a:t>
+              <a:t>Meilleurs que la baseline modèle</a:t>
             </a:r>
             <a:endParaRPr b="0" lang="fr-FR" sz="1800" spc="-1" strike="noStrike">
               <a:latin typeface="Arial"/>
             </a:endParaRPr>
           </a:p>
-          <a:p>
-            <a:pPr>
-              <a:lnSpc>
-                <a:spcPct val="100000"/>
-              </a:lnSpc>
-            </a:pPr>
-            <a:endParaRPr b="0" lang="fr-FR" sz="1800" spc="-1" strike="noStrike">
-              <a:latin typeface="Arial"/>
-            </a:endParaRPr>
-          </a:p>
-          <a:p>
-            <a:pPr>
-              <a:lnSpc>
-                <a:spcPct val="100000"/>
-              </a:lnSpc>
-            </a:pPr>
-            <a:r>
-              <a:rPr b="0" i="1" lang="fr-FR" sz="1800" spc="-1" strike="noStrike">
-                <a:solidFill>
-                  <a:srgbClr val="000000"/>
-                </a:solidFill>
-                <a:latin typeface="Franklin Gothic Book"/>
-                <a:ea typeface="DejaVu Sans"/>
-              </a:rPr>
-              <a:t>- Conversion des lettres en minuscule</a:t>
-            </a:r>
-            <a:endParaRPr b="0" lang="fr-FR" sz="1800" spc="-1" strike="noStrike">
-              <a:latin typeface="Arial"/>
-            </a:endParaRPr>
-          </a:p>
-          <a:p>
-            <a:pPr>
-              <a:lnSpc>
-                <a:spcPct val="100000"/>
-              </a:lnSpc>
-            </a:pPr>
-            <a:endParaRPr b="0" lang="fr-FR" sz="1800" spc="-1" strike="noStrike">
-              <a:latin typeface="Arial"/>
-            </a:endParaRPr>
-          </a:p>
-          <a:p>
-            <a:pPr>
-              <a:lnSpc>
-                <a:spcPct val="100000"/>
-              </a:lnSpc>
-            </a:pPr>
-            <a:r>
-              <a:rPr b="0" i="1" lang="fr-FR" sz="1800" spc="-1" strike="noStrike">
-                <a:solidFill>
-                  <a:srgbClr val="000000"/>
-                </a:solidFill>
-                <a:latin typeface="Franklin Gothic Book"/>
-                <a:ea typeface="DejaVu Sans"/>
-              </a:rPr>
-              <a:t>- Extraction des mots les plus fréquents dans les expressions anglaises (stopwords)</a:t>
-            </a:r>
-            <a:endParaRPr b="0" lang="fr-FR" sz="1800" spc="-1" strike="noStrike">
-              <a:latin typeface="Arial"/>
-            </a:endParaRPr>
-          </a:p>
-          <a:p>
-            <a:pPr>
-              <a:lnSpc>
-                <a:spcPct val="100000"/>
-              </a:lnSpc>
-            </a:pPr>
-            <a:endParaRPr b="0" lang="fr-FR" sz="1800" spc="-1" strike="noStrike">
-              <a:latin typeface="Arial"/>
-            </a:endParaRPr>
-          </a:p>
-          <a:p>
-            <a:pPr>
-              <a:lnSpc>
-                <a:spcPct val="100000"/>
-              </a:lnSpc>
-            </a:pPr>
-            <a:r>
-              <a:rPr b="0" i="1" lang="fr-FR" sz="1800" spc="-1" strike="noStrike">
-                <a:solidFill>
-                  <a:srgbClr val="000000"/>
-                </a:solidFill>
-                <a:latin typeface="Franklin Gothic Book"/>
-                <a:ea typeface="DejaVu Sans"/>
-              </a:rPr>
-              <a:t>- Constitution du corpus des mots analysés</a:t>
-            </a:r>
-            <a:endParaRPr b="0" lang="fr-FR" sz="1800" spc="-1" strike="noStrike">
-              <a:latin typeface="Arial"/>
-            </a:endParaRPr>
-          </a:p>
-          <a:p>
-            <a:pPr>
-              <a:lnSpc>
-                <a:spcPct val="100000"/>
-              </a:lnSpc>
-            </a:pPr>
-            <a:endParaRPr b="0" lang="fr-FR" sz="1800" spc="-1" strike="noStrike">
-              <a:latin typeface="Arial"/>
-            </a:endParaRPr>
-          </a:p>
-          <a:p>
-            <a:pPr>
-              <a:lnSpc>
-                <a:spcPct val="100000"/>
-              </a:lnSpc>
-            </a:pPr>
-            <a:r>
-              <a:rPr b="0" i="1" lang="fr-FR" sz="1800" spc="-1" strike="noStrike">
-                <a:solidFill>
-                  <a:srgbClr val="000000"/>
-                </a:solidFill>
-                <a:latin typeface="Franklin Gothic Book"/>
-                <a:ea typeface="DejaVu Sans"/>
-              </a:rPr>
-              <a:t>- Quantification de la fréquence des mots dans le corpus</a:t>
-            </a:r>
-            <a:endParaRPr b="0" lang="fr-FR" sz="1800" spc="-1" strike="noStrike">
-              <a:latin typeface="Arial"/>
-            </a:endParaRPr>
-          </a:p>
-        </p:txBody>
-      </p:sp>
-      <p:sp>
-        <p:nvSpPr>
-          <p:cNvPr id="104" name="CustomShape 3"/>
+        </p:txBody>
+      </p:sp>
+      <p:sp>
+        <p:nvSpPr>
+          <p:cNvPr id="110" name="CustomShape 2"/>
           <p:cNvSpPr/>
           <p:nvPr/>
         </p:nvSpPr>
         <p:spPr>
           <a:xfrm>
-            <a:off x="1476000" y="2160000"/>
-            <a:ext cx="2841120" cy="363960"/>
+            <a:off x="1404000" y="1003320"/>
+            <a:ext cx="9396000" cy="364680"/>
           </a:xfrm>
           <a:prstGeom prst="rect">
             <a:avLst/>
@@ -7014,7 +6753,7 @@
                 <a:latin typeface="Franklin Gothic Book"/>
                 <a:ea typeface="DejaVu Sans"/>
               </a:rPr>
-              <a:t>Méthodologie Texte</a:t>
+              <a:t>Tests de modèles : Logistic Regression et kNN</a:t>
             </a:r>
             <a:endParaRPr b="0" lang="fr-FR" sz="1800" spc="-1" strike="noStrike">
               <a:latin typeface="Arial"/>
@@ -7022,6 +6761,29 @@
           </a:p>
         </p:txBody>
       </p:sp>
+      <p:pic>
+        <p:nvPicPr>
+          <p:cNvPr id="111" name="" descr=""/>
+          <p:cNvPicPr/>
+          <p:nvPr/>
+        </p:nvPicPr>
+        <p:blipFill>
+          <a:blip r:embed="rId1"/>
+          <a:stretch/>
+        </p:blipFill>
+        <p:spPr>
+          <a:xfrm>
+            <a:off x="1769400" y="1476000"/>
+            <a:ext cx="7986600" cy="4485240"/>
+          </a:xfrm>
+          <a:prstGeom prst="rect">
+            <a:avLst/>
+          </a:prstGeom>
+          <a:ln>
+            <a:noFill/>
+          </a:ln>
+        </p:spPr>
+      </p:pic>
     </p:spTree>
   </p:cSld>
   <mc:AlternateContent>
@@ -7054,14 +6816,14 @@
       </p:grpSpPr>
       <p:sp>
         <p:nvSpPr>
-          <p:cNvPr id="105" name="CustomShape 1"/>
+          <p:cNvPr id="112" name="CustomShape 1"/>
           <p:cNvSpPr/>
           <p:nvPr/>
         </p:nvSpPr>
         <p:spPr>
           <a:xfrm>
-            <a:off x="3312000" y="5724000"/>
-            <a:ext cx="6513120" cy="333000"/>
+            <a:off x="1335240" y="5904000"/>
+            <a:ext cx="9104760" cy="364680"/>
           </a:xfrm>
           <a:prstGeom prst="rect">
             <a:avLst/>
@@ -7082,60 +6844,37 @@
             <a:spAutoFit/>
           </a:bodyPr>
           <a:p>
-            <a:pPr>
+            <a:pPr algn="ctr">
               <a:lnSpc>
                 <a:spcPct val="100000"/>
               </a:lnSpc>
             </a:pPr>
             <a:r>
-              <a:rPr b="0" i="1" lang="fr-FR" sz="1600" spc="-1" strike="noStrike">
+              <a:rPr b="0" i="1" lang="fr-FR" sz="1800" spc="-1" strike="noStrike">
                 <a:solidFill>
                   <a:srgbClr val="000000"/>
                 </a:solidFill>
                 <a:latin typeface="Franklin Gothic Book"/>
                 <a:ea typeface="DejaVu Sans"/>
               </a:rPr>
-              <a:t>Mots-clés les plus présents dans les descriptions des articles</a:t>
+              <a:t>Meilleurs que la baseline modèle</a:t>
             </a:r>
-            <a:endParaRPr b="0" lang="fr-FR" sz="1600" spc="-1" strike="noStrike">
-              <a:latin typeface="Arial"/>
-            </a:endParaRPr>
-          </a:p>
-        </p:txBody>
-      </p:sp>
-      <p:pic>
-        <p:nvPicPr>
-          <p:cNvPr id="106" name="" descr=""/>
-          <p:cNvPicPr/>
-          <p:nvPr/>
-        </p:nvPicPr>
-        <p:blipFill>
-          <a:blip r:embed="rId1"/>
-          <a:stretch/>
-        </p:blipFill>
-        <p:spPr>
-          <a:xfrm>
-            <a:off x="3384000" y="2736000"/>
-            <a:ext cx="5664600" cy="2877120"/>
-          </a:xfrm>
-          <a:prstGeom prst="rect">
-            <a:avLst/>
-          </a:prstGeom>
-          <a:ln>
-            <a:noFill/>
-          </a:ln>
-        </p:spPr>
-      </p:pic>
-      <p:sp>
-        <p:nvSpPr>
-          <p:cNvPr id="107" name="CustomShape 2"/>
+            <a:endParaRPr b="0" lang="fr-FR" sz="1800" spc="-1" strike="noStrike">
+              <a:latin typeface="Arial"/>
+            </a:endParaRPr>
+          </a:p>
+        </p:txBody>
+      </p:sp>
+      <p:sp>
+        <p:nvSpPr>
+          <p:cNvPr id="113" name="CustomShape 2"/>
           <p:cNvSpPr/>
           <p:nvPr/>
         </p:nvSpPr>
         <p:spPr>
           <a:xfrm>
-            <a:off x="1476000" y="2160000"/>
-            <a:ext cx="2841120" cy="363960"/>
+            <a:off x="1404000" y="1003320"/>
+            <a:ext cx="9396000" cy="364680"/>
           </a:xfrm>
           <a:prstGeom prst="rect">
             <a:avLst/>
@@ -7169,7 +6908,7 @@
                 <a:latin typeface="Franklin Gothic Book"/>
                 <a:ea typeface="DejaVu Sans"/>
               </a:rPr>
-              <a:t>Pré-traitement Texte</a:t>
+              <a:t>Hyper Optimisation de ces modèles : GridSearchCV</a:t>
             </a:r>
             <a:endParaRPr b="0" lang="fr-FR" sz="1800" spc="-1" strike="noStrike">
               <a:latin typeface="Arial"/>
@@ -7177,6 +6916,52 @@
           </a:p>
         </p:txBody>
       </p:sp>
+      <p:pic>
+        <p:nvPicPr>
+          <p:cNvPr id="114" name="" descr=""/>
+          <p:cNvPicPr/>
+          <p:nvPr/>
+        </p:nvPicPr>
+        <p:blipFill>
+          <a:blip r:embed="rId1"/>
+          <a:stretch/>
+        </p:blipFill>
+        <p:spPr>
+          <a:xfrm>
+            <a:off x="2052000" y="1656000"/>
+            <a:ext cx="8998560" cy="2016000"/>
+          </a:xfrm>
+          <a:prstGeom prst="rect">
+            <a:avLst/>
+          </a:prstGeom>
+          <a:ln>
+            <a:noFill/>
+          </a:ln>
+        </p:spPr>
+      </p:pic>
+      <p:pic>
+        <p:nvPicPr>
+          <p:cNvPr id="115" name="" descr=""/>
+          <p:cNvPicPr/>
+          <p:nvPr/>
+        </p:nvPicPr>
+        <p:blipFill>
+          <a:blip r:embed="rId2"/>
+          <a:stretch/>
+        </p:blipFill>
+        <p:spPr>
+          <a:xfrm>
+            <a:off x="2160360" y="4015440"/>
+            <a:ext cx="8895960" cy="1816560"/>
+          </a:xfrm>
+          <a:prstGeom prst="rect">
+            <a:avLst/>
+          </a:prstGeom>
+          <a:ln>
+            <a:noFill/>
+          </a:ln>
+        </p:spPr>
+      </p:pic>
     </p:spTree>
   </p:cSld>
   <mc:AlternateContent>
@@ -7209,14 +6994,14 @@
       </p:grpSpPr>
       <p:sp>
         <p:nvSpPr>
-          <p:cNvPr id="108" name="CustomShape 1"/>
+          <p:cNvPr id="116" name="CustomShape 1"/>
           <p:cNvSpPr/>
           <p:nvPr/>
         </p:nvSpPr>
         <p:spPr>
           <a:xfrm>
-            <a:off x="2664000" y="5724000"/>
-            <a:ext cx="7161120" cy="333000"/>
+            <a:off x="1404000" y="1003320"/>
+            <a:ext cx="9396000" cy="364680"/>
           </a:xfrm>
           <a:prstGeom prst="rect">
             <a:avLst/>
@@ -7243,16 +7028,16 @@
               </a:lnSpc>
             </a:pPr>
             <a:r>
-              <a:rPr b="0" i="1" lang="fr-FR" sz="1600" spc="-1" strike="noStrike">
+              <a:rPr b="1" lang="fr-FR" sz="1800" spc="-1" strike="noStrike">
                 <a:solidFill>
                   <a:srgbClr val="000000"/>
                 </a:solidFill>
                 <a:latin typeface="Franklin Gothic Book"/>
                 <a:ea typeface="DejaVu Sans"/>
               </a:rPr>
-              <a:t>Mots-clés les plus présents dans les descriptions par catégorie d’articles</a:t>
+              <a:t>Hyper Optimisation de ces modèles : GridSearchCV</a:t>
             </a:r>
-            <a:endParaRPr b="0" lang="fr-FR" sz="1600" spc="-1" strike="noStrike">
+            <a:endParaRPr b="0" lang="fr-FR" sz="1800" spc="-1" strike="noStrike">
               <a:latin typeface="Arial"/>
             </a:endParaRPr>
           </a:p>
@@ -7260,7 +7045,7 @@
       </p:sp>
       <p:pic>
         <p:nvPicPr>
-          <p:cNvPr id="109" name="" descr=""/>
+          <p:cNvPr id="117" name="" descr=""/>
           <p:cNvPicPr/>
           <p:nvPr/>
         </p:nvPicPr>
@@ -7270,8 +7055,8 @@
         </p:blipFill>
         <p:spPr>
           <a:xfrm>
-            <a:off x="487800" y="645840"/>
-            <a:ext cx="2877480" cy="1437480"/>
+            <a:off x="340560" y="1538280"/>
+            <a:ext cx="4809600" cy="4797720"/>
           </a:xfrm>
           <a:prstGeom prst="rect">
             <a:avLst/>
@@ -7281,60 +7066,9 @@
           </a:ln>
         </p:spPr>
       </p:pic>
-      <p:sp>
-        <p:nvSpPr>
-          <p:cNvPr id="110" name="CustomShape 2"/>
-          <p:cNvSpPr/>
-          <p:nvPr/>
-        </p:nvSpPr>
-        <p:spPr>
-          <a:xfrm>
-            <a:off x="1260000" y="288000"/>
-            <a:ext cx="1581480" cy="363960"/>
-          </a:xfrm>
-          <a:prstGeom prst="rect">
-            <a:avLst/>
-          </a:prstGeom>
-          <a:noFill/>
-          <a:ln>
-            <a:noFill/>
-          </a:ln>
-        </p:spPr>
-        <p:style>
-          <a:lnRef idx="0"/>
-          <a:fillRef idx="0"/>
-          <a:effectRef idx="0"/>
-          <a:fontRef idx="minor"/>
-        </p:style>
-        <p:txBody>
-          <a:bodyPr lIns="90000" rIns="90000" tIns="45000" bIns="45000">
-            <a:spAutoFit/>
-          </a:bodyPr>
-          <a:p>
-            <a:pPr>
-              <a:lnSpc>
-                <a:spcPct val="100000"/>
-              </a:lnSpc>
-            </a:pPr>
-            <a:r>
-              <a:rPr b="0" lang="fr-FR" sz="1800" spc="-1" strike="noStrike">
-                <a:solidFill>
-                  <a:srgbClr val="000000"/>
-                </a:solidFill>
-                <a:latin typeface="Arial"/>
-                <a:ea typeface="DejaVu Sans"/>
-              </a:rPr>
-              <a:t>Baby</a:t>
-            </a:r>
-            <a:endParaRPr b="0" lang="fr-FR" sz="1800" spc="-1" strike="noStrike">
-              <a:latin typeface="Arial"/>
-            </a:endParaRPr>
-          </a:p>
-        </p:txBody>
-      </p:sp>
       <p:pic>
         <p:nvPicPr>
-          <p:cNvPr id="111" name="" descr=""/>
+          <p:cNvPr id="118" name="" descr=""/>
           <p:cNvPicPr/>
           <p:nvPr/>
         </p:nvPicPr>
@@ -7344,8 +7078,8 @@
         </p:blipFill>
         <p:spPr>
           <a:xfrm>
-            <a:off x="4680000" y="576000"/>
-            <a:ext cx="2877480" cy="1437480"/>
+            <a:off x="5644440" y="1566000"/>
+            <a:ext cx="6343560" cy="4698000"/>
           </a:xfrm>
           <a:prstGeom prst="rect">
             <a:avLst/>
@@ -7355,427 +7089,6 @@
           </a:ln>
         </p:spPr>
       </p:pic>
-      <p:sp>
-        <p:nvSpPr>
-          <p:cNvPr id="112" name="CustomShape 3"/>
-          <p:cNvSpPr/>
-          <p:nvPr/>
-        </p:nvSpPr>
-        <p:spPr>
-          <a:xfrm>
-            <a:off x="5616000" y="229680"/>
-            <a:ext cx="1581480" cy="363960"/>
-          </a:xfrm>
-          <a:prstGeom prst="rect">
-            <a:avLst/>
-          </a:prstGeom>
-          <a:noFill/>
-          <a:ln>
-            <a:noFill/>
-          </a:ln>
-        </p:spPr>
-        <p:style>
-          <a:lnRef idx="0"/>
-          <a:fillRef idx="0"/>
-          <a:effectRef idx="0"/>
-          <a:fontRef idx="minor"/>
-        </p:style>
-        <p:txBody>
-          <a:bodyPr lIns="90000" rIns="90000" tIns="45000" bIns="45000">
-            <a:spAutoFit/>
-          </a:bodyPr>
-          <a:p>
-            <a:pPr>
-              <a:lnSpc>
-                <a:spcPct val="100000"/>
-              </a:lnSpc>
-            </a:pPr>
-            <a:r>
-              <a:rPr b="0" lang="fr-FR" sz="1800" spc="-1" strike="noStrike">
-                <a:solidFill>
-                  <a:srgbClr val="000000"/>
-                </a:solidFill>
-                <a:latin typeface="Arial"/>
-                <a:ea typeface="DejaVu Sans"/>
-              </a:rPr>
-              <a:t>Kitchen</a:t>
-            </a:r>
-            <a:endParaRPr b="0" lang="fr-FR" sz="1800" spc="-1" strike="noStrike">
-              <a:latin typeface="Arial"/>
-            </a:endParaRPr>
-          </a:p>
-        </p:txBody>
-      </p:sp>
-      <p:pic>
-        <p:nvPicPr>
-          <p:cNvPr id="113" name="" descr=""/>
-          <p:cNvPicPr/>
-          <p:nvPr/>
-        </p:nvPicPr>
-        <p:blipFill>
-          <a:blip r:embed="rId3"/>
-          <a:stretch/>
-        </p:blipFill>
-        <p:spPr>
-          <a:xfrm>
-            <a:off x="576000" y="4104000"/>
-            <a:ext cx="2877480" cy="1437480"/>
-          </a:xfrm>
-          <a:prstGeom prst="rect">
-            <a:avLst/>
-          </a:prstGeom>
-          <a:ln>
-            <a:noFill/>
-          </a:ln>
-        </p:spPr>
-      </p:pic>
-      <p:sp>
-        <p:nvSpPr>
-          <p:cNvPr id="114" name="CustomShape 4"/>
-          <p:cNvSpPr/>
-          <p:nvPr/>
-        </p:nvSpPr>
-        <p:spPr>
-          <a:xfrm>
-            <a:off x="1224000" y="3636000"/>
-            <a:ext cx="1581480" cy="363960"/>
-          </a:xfrm>
-          <a:prstGeom prst="rect">
-            <a:avLst/>
-          </a:prstGeom>
-          <a:noFill/>
-          <a:ln>
-            <a:noFill/>
-          </a:ln>
-        </p:spPr>
-        <p:style>
-          <a:lnRef idx="0"/>
-          <a:fillRef idx="0"/>
-          <a:effectRef idx="0"/>
-          <a:fontRef idx="minor"/>
-        </p:style>
-        <p:txBody>
-          <a:bodyPr lIns="90000" rIns="90000" tIns="45000" bIns="45000">
-            <a:spAutoFit/>
-          </a:bodyPr>
-          <a:p>
-            <a:pPr>
-              <a:lnSpc>
-                <a:spcPct val="100000"/>
-              </a:lnSpc>
-            </a:pPr>
-            <a:r>
-              <a:rPr b="0" lang="fr-FR" sz="1800" spc="-1" strike="noStrike">
-                <a:solidFill>
-                  <a:srgbClr val="000000"/>
-                </a:solidFill>
-                <a:latin typeface="Arial"/>
-                <a:ea typeface="DejaVu Sans"/>
-              </a:rPr>
-              <a:t>Beauty</a:t>
-            </a:r>
-            <a:endParaRPr b="0" lang="fr-FR" sz="1800" spc="-1" strike="noStrike">
-              <a:latin typeface="Arial"/>
-            </a:endParaRPr>
-          </a:p>
-        </p:txBody>
-      </p:sp>
-      <p:pic>
-        <p:nvPicPr>
-          <p:cNvPr id="115" name="" descr=""/>
-          <p:cNvPicPr/>
-          <p:nvPr/>
-        </p:nvPicPr>
-        <p:blipFill>
-          <a:blip r:embed="rId4"/>
-          <a:stretch/>
-        </p:blipFill>
-        <p:spPr>
-          <a:xfrm>
-            <a:off x="4716000" y="4068000"/>
-            <a:ext cx="2877480" cy="1437480"/>
-          </a:xfrm>
-          <a:prstGeom prst="rect">
-            <a:avLst/>
-          </a:prstGeom>
-          <a:ln>
-            <a:noFill/>
-          </a:ln>
-        </p:spPr>
-      </p:pic>
-      <p:sp>
-        <p:nvSpPr>
-          <p:cNvPr id="116" name="CustomShape 5"/>
-          <p:cNvSpPr/>
-          <p:nvPr/>
-        </p:nvSpPr>
-        <p:spPr>
-          <a:xfrm>
-            <a:off x="5616000" y="3636000"/>
-            <a:ext cx="1581480" cy="363960"/>
-          </a:xfrm>
-          <a:prstGeom prst="rect">
-            <a:avLst/>
-          </a:prstGeom>
-          <a:noFill/>
-          <a:ln>
-            <a:noFill/>
-          </a:ln>
-        </p:spPr>
-        <p:style>
-          <a:lnRef idx="0"/>
-          <a:fillRef idx="0"/>
-          <a:effectRef idx="0"/>
-          <a:fontRef idx="minor"/>
-        </p:style>
-        <p:txBody>
-          <a:bodyPr lIns="90000" rIns="90000" tIns="45000" bIns="45000">
-            <a:spAutoFit/>
-          </a:bodyPr>
-          <a:p>
-            <a:pPr>
-              <a:lnSpc>
-                <a:spcPct val="100000"/>
-              </a:lnSpc>
-            </a:pPr>
-            <a:r>
-              <a:rPr b="0" lang="fr-FR" sz="1800" spc="-1" strike="noStrike">
-                <a:solidFill>
-                  <a:srgbClr val="000000"/>
-                </a:solidFill>
-                <a:latin typeface="Arial"/>
-                <a:ea typeface="DejaVu Sans"/>
-              </a:rPr>
-              <a:t>Computers</a:t>
-            </a:r>
-            <a:endParaRPr b="0" lang="fr-FR" sz="1800" spc="-1" strike="noStrike">
-              <a:latin typeface="Arial"/>
-            </a:endParaRPr>
-          </a:p>
-        </p:txBody>
-      </p:sp>
-      <p:pic>
-        <p:nvPicPr>
-          <p:cNvPr id="117" name="" descr=""/>
-          <p:cNvPicPr/>
-          <p:nvPr/>
-        </p:nvPicPr>
-        <p:blipFill>
-          <a:blip r:embed="rId5"/>
-          <a:stretch/>
-        </p:blipFill>
-        <p:spPr>
-          <a:xfrm>
-            <a:off x="8462160" y="582480"/>
-            <a:ext cx="2877480" cy="1437480"/>
-          </a:xfrm>
-          <a:prstGeom prst="rect">
-            <a:avLst/>
-          </a:prstGeom>
-          <a:ln>
-            <a:noFill/>
-          </a:ln>
-        </p:spPr>
-      </p:pic>
-      <p:sp>
-        <p:nvSpPr>
-          <p:cNvPr id="118" name="CustomShape 6"/>
-          <p:cNvSpPr/>
-          <p:nvPr/>
-        </p:nvSpPr>
-        <p:spPr>
-          <a:xfrm>
-            <a:off x="8856000" y="229680"/>
-            <a:ext cx="1581480" cy="363960"/>
-          </a:xfrm>
-          <a:prstGeom prst="rect">
-            <a:avLst/>
-          </a:prstGeom>
-          <a:noFill/>
-          <a:ln>
-            <a:noFill/>
-          </a:ln>
-        </p:spPr>
-        <p:style>
-          <a:lnRef idx="0"/>
-          <a:fillRef idx="0"/>
-          <a:effectRef idx="0"/>
-          <a:fontRef idx="minor"/>
-        </p:style>
-        <p:txBody>
-          <a:bodyPr lIns="90000" rIns="90000" tIns="45000" bIns="45000">
-            <a:spAutoFit/>
-          </a:bodyPr>
-          <a:p>
-            <a:pPr>
-              <a:lnSpc>
-                <a:spcPct val="100000"/>
-              </a:lnSpc>
-            </a:pPr>
-            <a:r>
-              <a:rPr b="0" lang="fr-FR" sz="1800" spc="-1" strike="noStrike">
-                <a:solidFill>
-                  <a:srgbClr val="000000"/>
-                </a:solidFill>
-                <a:latin typeface="Arial"/>
-                <a:ea typeface="DejaVu Sans"/>
-              </a:rPr>
-              <a:t>Furnishing</a:t>
-            </a:r>
-            <a:endParaRPr b="0" lang="fr-FR" sz="1800" spc="-1" strike="noStrike">
-              <a:latin typeface="Arial"/>
-            </a:endParaRPr>
-          </a:p>
-        </p:txBody>
-      </p:sp>
-      <p:pic>
-        <p:nvPicPr>
-          <p:cNvPr id="119" name="" descr=""/>
-          <p:cNvPicPr/>
-          <p:nvPr/>
-        </p:nvPicPr>
-        <p:blipFill>
-          <a:blip r:embed="rId6"/>
-          <a:stretch/>
-        </p:blipFill>
-        <p:spPr>
-          <a:xfrm>
-            <a:off x="8568000" y="4032000"/>
-            <a:ext cx="2877480" cy="1437480"/>
-          </a:xfrm>
-          <a:prstGeom prst="rect">
-            <a:avLst/>
-          </a:prstGeom>
-          <a:ln>
-            <a:noFill/>
-          </a:ln>
-        </p:spPr>
-      </p:pic>
-      <p:sp>
-        <p:nvSpPr>
-          <p:cNvPr id="120" name="CustomShape 7"/>
-          <p:cNvSpPr/>
-          <p:nvPr/>
-        </p:nvSpPr>
-        <p:spPr>
-          <a:xfrm>
-            <a:off x="9180000" y="3600000"/>
-            <a:ext cx="1581480" cy="363960"/>
-          </a:xfrm>
-          <a:prstGeom prst="rect">
-            <a:avLst/>
-          </a:prstGeom>
-          <a:noFill/>
-          <a:ln>
-            <a:noFill/>
-          </a:ln>
-        </p:spPr>
-        <p:style>
-          <a:lnRef idx="0"/>
-          <a:fillRef idx="0"/>
-          <a:effectRef idx="0"/>
-          <a:fontRef idx="minor"/>
-        </p:style>
-        <p:txBody>
-          <a:bodyPr lIns="90000" rIns="90000" tIns="45000" bIns="45000">
-            <a:spAutoFit/>
-          </a:bodyPr>
-          <a:p>
-            <a:pPr>
-              <a:lnSpc>
-                <a:spcPct val="100000"/>
-              </a:lnSpc>
-            </a:pPr>
-            <a:r>
-              <a:rPr b="0" lang="fr-FR" sz="1800" spc="-1" strike="noStrike">
-                <a:solidFill>
-                  <a:srgbClr val="000000"/>
-                </a:solidFill>
-                <a:latin typeface="Arial"/>
-                <a:ea typeface="DejaVu Sans"/>
-              </a:rPr>
-              <a:t>Decor</a:t>
-            </a:r>
-            <a:endParaRPr b="0" lang="fr-FR" sz="1800" spc="-1" strike="noStrike">
-              <a:latin typeface="Arial"/>
-            </a:endParaRPr>
-          </a:p>
-        </p:txBody>
-      </p:sp>
-      <p:pic>
-        <p:nvPicPr>
-          <p:cNvPr id="121" name="" descr=""/>
-          <p:cNvPicPr/>
-          <p:nvPr/>
-        </p:nvPicPr>
-        <p:blipFill>
-          <a:blip r:embed="rId7"/>
-          <a:stretch/>
-        </p:blipFill>
-        <p:spPr>
-          <a:xfrm>
-            <a:off x="4716000" y="2232000"/>
-            <a:ext cx="2877480" cy="1437480"/>
-          </a:xfrm>
-          <a:prstGeom prst="rect">
-            <a:avLst/>
-          </a:prstGeom>
-          <a:ln>
-            <a:noFill/>
-          </a:ln>
-        </p:spPr>
-      </p:pic>
-      <p:sp>
-        <p:nvSpPr>
-          <p:cNvPr id="122" name="CustomShape 8"/>
-          <p:cNvSpPr/>
-          <p:nvPr/>
-        </p:nvSpPr>
-        <p:spPr>
-          <a:xfrm>
-            <a:off x="3600000" y="2844000"/>
-            <a:ext cx="1581480" cy="363960"/>
-          </a:xfrm>
-          <a:prstGeom prst="rect">
-            <a:avLst/>
-          </a:prstGeom>
-          <a:noFill/>
-          <a:ln>
-            <a:noFill/>
-          </a:ln>
-        </p:spPr>
-        <p:style>
-          <a:lnRef idx="0"/>
-          <a:fillRef idx="0"/>
-          <a:effectRef idx="0"/>
-          <a:fontRef idx="minor"/>
-        </p:style>
-        <p:txBody>
-          <a:bodyPr lIns="90000" rIns="90000" tIns="45000" bIns="45000">
-            <a:spAutoFit/>
-          </a:bodyPr>
-          <a:p>
-            <a:pPr>
-              <a:lnSpc>
-                <a:spcPct val="100000"/>
-              </a:lnSpc>
-            </a:pPr>
-            <a:r>
-              <a:rPr b="0" lang="fr-FR" sz="1800" spc="-1" strike="noStrike">
-                <a:solidFill>
-                  <a:srgbClr val="000000"/>
-                </a:solidFill>
-                <a:latin typeface="Arial"/>
-                <a:ea typeface="DejaVu Sans"/>
-              </a:rPr>
-              <a:t>Watches</a:t>
-            </a:r>
-            <a:endParaRPr b="0" lang="fr-FR" sz="1800" spc="-1" strike="noStrike">
-              <a:latin typeface="Arial"/>
-            </a:endParaRPr>
-          </a:p>
-        </p:txBody>
-      </p:sp>
     </p:spTree>
   </p:cSld>
   <mc:AlternateContent>

</xml_diff>

<commit_message>
avec la trame complètes et les illustrations intégrées
</commit_message>
<xml_diff>
--- a/P7_support.pptx
+++ b/P7_support.pptx
@@ -19,10 +19,6 @@
     <p:sldId id="266" r:id="rId14"/>
     <p:sldId id="267" r:id="rId15"/>
     <p:sldId id="268" r:id="rId16"/>
-    <p:sldId id="269" r:id="rId17"/>
-    <p:sldId id="270" r:id="rId18"/>
-    <p:sldId id="271" r:id="rId19"/>
-    <p:sldId id="272" r:id="rId20"/>
   </p:sldIdLst>
   <p:sldSz cx="12192000" cy="6858000"/>
   <p:notesSz cx="7559675" cy="10691812"/>
@@ -4015,67 +4011,6 @@
           </a:p>
         </p:txBody>
       </p:sp>
-      <p:sp>
-        <p:nvSpPr>
-          <p:cNvPr id="121" name="CustomShape 3"/>
-          <p:cNvSpPr/>
-          <p:nvPr/>
-        </p:nvSpPr>
-        <p:spPr>
-          <a:xfrm>
-            <a:off x="1368000" y="4536000"/>
-            <a:ext cx="2589120" cy="285120"/>
-          </a:xfrm>
-          <a:custGeom>
-            <a:avLst/>
-            <a:gdLst/>
-            <a:ahLst/>
-            <a:rect l="l" t="t" r="r" b="b"/>
-            <a:pathLst>
-              <a:path w="7202" h="802">
-                <a:moveTo>
-                  <a:pt x="0" y="200"/>
-                </a:moveTo>
-                <a:lnTo>
-                  <a:pt x="5400" y="200"/>
-                </a:lnTo>
-                <a:lnTo>
-                  <a:pt x="5400" y="0"/>
-                </a:lnTo>
-                <a:lnTo>
-                  <a:pt x="7201" y="400"/>
-                </a:lnTo>
-                <a:lnTo>
-                  <a:pt x="5400" y="801"/>
-                </a:lnTo>
-                <a:lnTo>
-                  <a:pt x="5400" y="600"/>
-                </a:lnTo>
-                <a:lnTo>
-                  <a:pt x="0" y="600"/>
-                </a:lnTo>
-                <a:lnTo>
-                  <a:pt x="0" y="200"/>
-                </a:lnTo>
-              </a:path>
-            </a:pathLst>
-          </a:custGeom>
-          <a:solidFill>
-            <a:srgbClr val="729fcf"/>
-          </a:solidFill>
-          <a:ln>
-            <a:solidFill>
-              <a:srgbClr val="3465a4"/>
-            </a:solidFill>
-          </a:ln>
-        </p:spPr>
-        <p:style>
-          <a:lnRef idx="0"/>
-          <a:fillRef idx="0"/>
-          <a:effectRef idx="0"/>
-          <a:fontRef idx="minor"/>
-        </p:style>
-      </p:sp>
     </p:spTree>
   </p:cSld>
   <mc:AlternateContent>
@@ -4106,39 +4041,16 @@
           <a:chExt cx="0" cy="0"/>
         </a:xfrm>
       </p:grpSpPr>
-      <p:pic>
-        <p:nvPicPr>
-          <p:cNvPr id="122" name="" descr=""/>
-          <p:cNvPicPr/>
-          <p:nvPr/>
-        </p:nvPicPr>
-        <p:blipFill>
-          <a:blip r:embed="rId1"/>
-          <a:stretch/>
-        </p:blipFill>
-        <p:spPr>
-          <a:xfrm>
-            <a:off x="411120" y="813600"/>
-            <a:ext cx="6198840" cy="5589360"/>
-          </a:xfrm>
-          <a:prstGeom prst="rect">
-            <a:avLst/>
-          </a:prstGeom>
-          <a:ln>
-            <a:noFill/>
-          </a:ln>
-        </p:spPr>
-      </p:pic>
-      <p:sp>
-        <p:nvSpPr>
-          <p:cNvPr id="123" name="CustomShape 1"/>
+      <p:sp>
+        <p:nvSpPr>
+          <p:cNvPr id="121" name="CustomShape 1"/>
           <p:cNvSpPr/>
           <p:nvPr/>
         </p:nvSpPr>
         <p:spPr>
           <a:xfrm>
-            <a:off x="3312000" y="216000"/>
-            <a:ext cx="7342200" cy="363960"/>
+            <a:off x="1097280" y="915480"/>
+            <a:ext cx="10049040" cy="930600"/>
           </a:xfrm>
           <a:prstGeom prst="rect">
             <a:avLst/>
@@ -4155,64 +4067,51 @@
           <a:fontRef idx="minor"/>
         </p:style>
         <p:txBody>
-          <a:bodyPr lIns="90000" rIns="90000" tIns="45000" bIns="45000">
-            <a:spAutoFit/>
-          </a:bodyPr>
-          <a:p>
-            <a:pPr>
+          <a:bodyPr lIns="0" rIns="0" tIns="45000" bIns="45000">
+            <a:normAutofit/>
+          </a:bodyPr>
+          <a:p>
+            <a:pPr algn="ctr">
               <a:lnSpc>
-                <a:spcPct val="100000"/>
+                <a:spcPct val="110000"/>
               </a:lnSpc>
+              <a:spcBef>
+                <a:spcPts val="1199"/>
+              </a:spcBef>
+              <a:spcAft>
+                <a:spcPts val="201"/>
+              </a:spcAft>
             </a:pPr>
             <a:r>
-              <a:rPr b="0" lang="fr-FR" sz="1800" spc="-1" strike="noStrike">
-                <a:solidFill>
-                  <a:srgbClr val="000000"/>
-                </a:solidFill>
-                <a:latin typeface="Arial"/>
+              <a:rPr b="0" lang="fr-FR" sz="4000" spc="-1" strike="noStrike">
+                <a:latin typeface="Franklin Gothic Book"/>
                 <a:ea typeface="DejaVu Sans"/>
               </a:rPr>
-              <a:t>REGRESSIONS OBTENUES PAR DIVERSES</a:t>
-            </a:r>
-            <a:endParaRPr b="0" lang="fr-FR" sz="1800" spc="-1" strike="noStrike">
-              <a:latin typeface="Arial"/>
-            </a:endParaRPr>
-          </a:p>
-        </p:txBody>
-      </p:sp>
-      <p:pic>
-        <p:nvPicPr>
-          <p:cNvPr id="124" name="" descr=""/>
-          <p:cNvPicPr/>
-          <p:nvPr/>
-        </p:nvPicPr>
-        <p:blipFill>
-          <a:blip r:embed="rId2"/>
-          <a:stretch/>
-        </p:blipFill>
-        <p:spPr>
-          <a:xfrm>
-            <a:off x="7776720" y="1800000"/>
-            <a:ext cx="3741480" cy="3455640"/>
-          </a:xfrm>
-          <a:prstGeom prst="rect">
-            <a:avLst/>
-          </a:prstGeom>
-          <a:ln>
-            <a:noFill/>
-          </a:ln>
-        </p:spPr>
-      </p:pic>
-      <p:sp>
-        <p:nvSpPr>
-          <p:cNvPr id="125" name="CustomShape 2"/>
+              <a:t>V – </a:t>
+            </a:r>
+            <a:r>
+              <a:rPr b="0" lang="fr-FR" sz="4000" spc="-1" strike="noStrike">
+                <a:latin typeface="Franklin Gothic Book"/>
+                <a:ea typeface="DejaVu Sans"/>
+              </a:rPr>
+              <a:t>Implémentation de dashboard</a:t>
+            </a:r>
+            <a:endParaRPr b="0" lang="fr-FR" sz="4000" spc="-1" strike="noStrike">
+              <a:latin typeface="Arial"/>
+            </a:endParaRPr>
+          </a:p>
+        </p:txBody>
+      </p:sp>
+      <p:sp>
+        <p:nvSpPr>
+          <p:cNvPr id="122" name="CustomShape 2"/>
           <p:cNvSpPr/>
           <p:nvPr/>
         </p:nvSpPr>
         <p:spPr>
           <a:xfrm>
-            <a:off x="8784000" y="1296000"/>
-            <a:ext cx="934200" cy="363960"/>
+            <a:off x="4320000" y="3083760"/>
+            <a:ext cx="3528000" cy="516240"/>
           </a:xfrm>
           <a:prstGeom prst="rect">
             <a:avLst/>
@@ -4239,67 +4138,19 @@
               </a:lnSpc>
             </a:pPr>
             <a:r>
-              <a:rPr b="0" lang="fr-FR" sz="1800" spc="-1" strike="noStrike">
+              <a:rPr b="0" lang="fr-FR" sz="2800" spc="-1" strike="noStrike">
                 <a:solidFill>
-                  <a:srgbClr val="000000"/>
+                  <a:srgbClr val="00a933"/>
                 </a:solidFill>
                 <a:latin typeface="Arial"/>
                 <a:ea typeface="DejaVu Sans"/>
               </a:rPr>
-              <a:t>NMF</a:t>
-            </a:r>
-            <a:endParaRPr b="0" lang="fr-FR" sz="1800" spc="-1" strike="noStrike">
-              <a:latin typeface="Arial"/>
-            </a:endParaRPr>
-          </a:p>
-        </p:txBody>
-      </p:sp>
-      <p:sp>
-        <p:nvSpPr>
-          <p:cNvPr id="126" name="CustomShape 3"/>
-          <p:cNvSpPr/>
-          <p:nvPr/>
-        </p:nvSpPr>
-        <p:spPr>
-          <a:xfrm>
-            <a:off x="3816000" y="1008000"/>
-            <a:ext cx="1114200" cy="363960"/>
-          </a:xfrm>
-          <a:prstGeom prst="rect">
-            <a:avLst/>
-          </a:prstGeom>
-          <a:noFill/>
-          <a:ln>
-            <a:noFill/>
-          </a:ln>
-        </p:spPr>
-        <p:style>
-          <a:lnRef idx="0"/>
-          <a:fillRef idx="0"/>
-          <a:effectRef idx="0"/>
-          <a:fontRef idx="minor"/>
-        </p:style>
-        <p:txBody>
-          <a:bodyPr lIns="90000" rIns="90000" tIns="45000" bIns="45000">
-            <a:spAutoFit/>
-          </a:bodyPr>
-          <a:p>
-            <a:pPr>
-              <a:lnSpc>
-                <a:spcPct val="100000"/>
-              </a:lnSpc>
-            </a:pPr>
-            <a:r>
-              <a:rPr b="0" lang="fr-FR" sz="1800" spc="-1" strike="noStrike">
-                <a:solidFill>
-                  <a:srgbClr val="000000"/>
-                </a:solidFill>
-                <a:latin typeface="Arial"/>
-                <a:ea typeface="DejaVu Sans"/>
-              </a:rPr>
-              <a:t>LDA</a:t>
-            </a:r>
-            <a:endParaRPr b="0" lang="fr-FR" sz="1800" spc="-1" strike="noStrike">
+              <a:t>Démonstration</a:t>
+            </a:r>
+            <a:endParaRPr b="0" lang="fr-FR" sz="2800" spc="-1" strike="noStrike">
+              <a:solidFill>
+                <a:srgbClr val="00a933"/>
+              </a:solidFill>
               <a:latin typeface="Arial"/>
             </a:endParaRPr>
           </a:p>
@@ -4337,14 +4188,14 @@
       </p:grpSpPr>
       <p:sp>
         <p:nvSpPr>
-          <p:cNvPr id="127" name="CustomShape 1"/>
+          <p:cNvPr id="123" name="CustomShape 1"/>
           <p:cNvSpPr/>
           <p:nvPr/>
         </p:nvSpPr>
         <p:spPr>
           <a:xfrm>
-            <a:off x="3312000" y="396000"/>
-            <a:ext cx="7342200" cy="363960"/>
+            <a:off x="1097280" y="879480"/>
+            <a:ext cx="10049040" cy="930600"/>
           </a:xfrm>
           <a:prstGeom prst="rect">
             <a:avLst/>
@@ -4361,6 +4212,63 @@
           <a:fontRef idx="minor"/>
         </p:style>
         <p:txBody>
+          <a:bodyPr lIns="0" rIns="0" tIns="45000" bIns="45000">
+            <a:normAutofit/>
+          </a:bodyPr>
+          <a:p>
+            <a:pPr algn="ctr">
+              <a:lnSpc>
+                <a:spcPct val="110000"/>
+              </a:lnSpc>
+              <a:spcBef>
+                <a:spcPts val="1199"/>
+              </a:spcBef>
+              <a:spcAft>
+                <a:spcPts val="201"/>
+              </a:spcAft>
+            </a:pPr>
+            <a:r>
+              <a:rPr b="0" lang="fr-FR" sz="4000" spc="-1" strike="noStrike">
+                <a:solidFill>
+                  <a:srgbClr val="404040"/>
+                </a:solidFill>
+                <a:latin typeface="Franklin Gothic Book"/>
+                <a:ea typeface="DejaVu Sans"/>
+              </a:rPr>
+              <a:t>VI – Conclusion et recommandations</a:t>
+            </a:r>
+            <a:endParaRPr b="0" lang="fr-FR" sz="4000" spc="-1" strike="noStrike">
+              <a:latin typeface="Arial"/>
+            </a:endParaRPr>
+          </a:p>
+        </p:txBody>
+      </p:sp>
+      <p:sp>
+        <p:nvSpPr>
+          <p:cNvPr id="124" name="CustomShape 2"/>
+          <p:cNvSpPr/>
+          <p:nvPr/>
+        </p:nvSpPr>
+        <p:spPr>
+          <a:xfrm>
+            <a:off x="1368000" y="2232000"/>
+            <a:ext cx="9717480" cy="3443760"/>
+          </a:xfrm>
+          <a:prstGeom prst="rect">
+            <a:avLst/>
+          </a:prstGeom>
+          <a:noFill/>
+          <a:ln>
+            <a:noFill/>
+          </a:ln>
+        </p:spPr>
+        <p:style>
+          <a:lnRef idx="0"/>
+          <a:fillRef idx="0"/>
+          <a:effectRef idx="0"/>
+          <a:fontRef idx="minor"/>
+        </p:style>
+        <p:txBody>
           <a:bodyPr lIns="90000" rIns="90000" tIns="45000" bIns="45000">
             <a:spAutoFit/>
           </a:bodyPr>
@@ -4371,44 +4279,81 @@
               </a:lnSpc>
             </a:pPr>
             <a:r>
-              <a:rPr b="0" lang="fr-FR" sz="1800" spc="-1" strike="noStrike">
+              <a:rPr b="0" lang="fr-FR" sz="2000" spc="-1" strike="noStrike">
                 <a:solidFill>
                   <a:srgbClr val="000000"/>
                 </a:solidFill>
                 <a:latin typeface="Arial"/>
                 <a:ea typeface="DejaVu Sans"/>
               </a:rPr>
-              <a:t>TOPICS avec le poids des mots dans le modèle LDA</a:t>
-            </a:r>
-            <a:endParaRPr b="0" lang="fr-FR" sz="1800" spc="-1" strike="noStrike">
-              <a:latin typeface="Arial"/>
-            </a:endParaRPr>
-          </a:p>
-        </p:txBody>
-      </p:sp>
-      <p:pic>
-        <p:nvPicPr>
-          <p:cNvPr id="128" name="" descr=""/>
-          <p:cNvPicPr/>
-          <p:nvPr/>
-        </p:nvPicPr>
-        <p:blipFill>
-          <a:blip r:embed="rId1"/>
-          <a:stretch/>
-        </p:blipFill>
-        <p:spPr>
-          <a:xfrm>
-            <a:off x="950040" y="848520"/>
-            <a:ext cx="10280880" cy="5511960"/>
-          </a:xfrm>
-          <a:prstGeom prst="rect">
-            <a:avLst/>
-          </a:prstGeom>
-          <a:ln>
-            <a:noFill/>
-          </a:ln>
-        </p:spPr>
-      </p:pic>
+              <a:t>LA BONNE RÉPARTITION DES CLUSTERS INDUIT LA FAISABILITÉ DU MOTEUR DE CLASSIFICATION AUTOMATIQUE. TOUTEFOIS, LES RATIOS D’ÉVALUATION SONT TRÈS FAIBLES.</a:t>
+            </a:r>
+            <a:endParaRPr b="0" lang="fr-FR" sz="2000" spc="-1" strike="noStrike">
+              <a:latin typeface="Arial"/>
+            </a:endParaRPr>
+          </a:p>
+          <a:p>
+            <a:pPr>
+              <a:lnSpc>
+                <a:spcPct val="100000"/>
+              </a:lnSpc>
+            </a:pPr>
+            <a:endParaRPr b="0" lang="fr-FR" sz="2000" spc="-1" strike="noStrike">
+              <a:latin typeface="Arial"/>
+            </a:endParaRPr>
+          </a:p>
+          <a:p>
+            <a:pPr>
+              <a:lnSpc>
+                <a:spcPct val="100000"/>
+              </a:lnSpc>
+            </a:pPr>
+            <a:r>
+              <a:rPr b="0" lang="fr-FR" sz="2000" spc="-1" strike="noStrike">
+                <a:solidFill>
+                  <a:srgbClr val="000000"/>
+                </a:solidFill>
+                <a:latin typeface="Arial"/>
+                <a:ea typeface="DejaVu Sans"/>
+              </a:rPr>
+              <a:t>EN EFFET, LA PRÉCISION ENTRE LES CLUSTERS IMAGE ET TEXTE EST DE 0,37.</a:t>
+            </a:r>
+            <a:endParaRPr b="0" lang="fr-FR" sz="2000" spc="-1" strike="noStrike">
+              <a:latin typeface="Arial"/>
+            </a:endParaRPr>
+          </a:p>
+          <a:p>
+            <a:pPr>
+              <a:lnSpc>
+                <a:spcPct val="100000"/>
+              </a:lnSpc>
+            </a:pPr>
+            <a:endParaRPr b="0" lang="fr-FR" sz="2000" spc="-1" strike="noStrike">
+              <a:latin typeface="Arial"/>
+            </a:endParaRPr>
+          </a:p>
+          <a:p>
+            <a:pPr>
+              <a:lnSpc>
+                <a:spcPct val="100000"/>
+              </a:lnSpc>
+            </a:pPr>
+            <a:r>
+              <a:rPr b="0" lang="fr-FR" sz="2000" spc="-1" strike="noStrike">
+                <a:solidFill>
+                  <a:srgbClr val="000000"/>
+                </a:solidFill>
+                <a:latin typeface="Arial"/>
+                <a:ea typeface="Microsoft YaHei"/>
+              </a:rPr>
+              <a:t>DES MÉTHODES AUTRES QUE LE SIFT (EXEMPLE CNN) SERAIENT A ENVISAGER POUR AMÉLIORER LES SCORES. PAR AILLEURS, LE NOMBRE CROISSANT D’ÉCHANTILLONS DEVRAIT PERMETTRE D’AMÉLIORER L’APPRENTISSAGE DU MODÈLE.</a:t>
+            </a:r>
+            <a:endParaRPr b="0" lang="fr-FR" sz="2000" spc="-1" strike="noStrike">
+              <a:latin typeface="Arial"/>
+            </a:endParaRPr>
+          </a:p>
+        </p:txBody>
+      </p:sp>
     </p:spTree>
   </p:cSld>
   <mc:AlternateContent>
@@ -4441,621 +4386,7 @@
       </p:grpSpPr>
       <p:sp>
         <p:nvSpPr>
-          <p:cNvPr id="129" name="CustomShape 1"/>
-          <p:cNvSpPr/>
-          <p:nvPr/>
-        </p:nvSpPr>
-        <p:spPr>
-          <a:xfrm>
-            <a:off x="3312000" y="396000"/>
-            <a:ext cx="7342200" cy="363960"/>
-          </a:xfrm>
-          <a:prstGeom prst="rect">
-            <a:avLst/>
-          </a:prstGeom>
-          <a:noFill/>
-          <a:ln>
-            <a:noFill/>
-          </a:ln>
-        </p:spPr>
-        <p:style>
-          <a:lnRef idx="0"/>
-          <a:fillRef idx="0"/>
-          <a:effectRef idx="0"/>
-          <a:fontRef idx="minor"/>
-        </p:style>
-        <p:txBody>
-          <a:bodyPr lIns="90000" rIns="90000" tIns="45000" bIns="45000">
-            <a:spAutoFit/>
-          </a:bodyPr>
-          <a:p>
-            <a:pPr>
-              <a:lnSpc>
-                <a:spcPct val="100000"/>
-              </a:lnSpc>
-            </a:pPr>
-            <a:r>
-              <a:rPr b="0" lang="fr-FR" sz="1800" spc="-1" strike="noStrike">
-                <a:solidFill>
-                  <a:srgbClr val="000000"/>
-                </a:solidFill>
-                <a:latin typeface="Arial"/>
-                <a:ea typeface="DejaVu Sans"/>
-              </a:rPr>
-              <a:t>TOPICS avec le poids des mots dans le modèle NMF</a:t>
-            </a:r>
-            <a:endParaRPr b="0" lang="fr-FR" sz="1800" spc="-1" strike="noStrike">
-              <a:latin typeface="Arial"/>
-            </a:endParaRPr>
-          </a:p>
-        </p:txBody>
-      </p:sp>
-      <p:pic>
-        <p:nvPicPr>
-          <p:cNvPr id="130" name="" descr=""/>
-          <p:cNvPicPr/>
-          <p:nvPr/>
-        </p:nvPicPr>
-        <p:blipFill>
-          <a:blip r:embed="rId1"/>
-          <a:stretch/>
-        </p:blipFill>
-        <p:spPr>
-          <a:xfrm>
-            <a:off x="781560" y="763560"/>
-            <a:ext cx="10449360" cy="5613840"/>
-          </a:xfrm>
-          <a:prstGeom prst="rect">
-            <a:avLst/>
-          </a:prstGeom>
-          <a:ln>
-            <a:noFill/>
-          </a:ln>
-        </p:spPr>
-      </p:pic>
-    </p:spTree>
-  </p:cSld>
-  <mc:AlternateContent>
-    <mc:Choice Requires="p14">
-      <p:transition spd="slow" p14:dur="2000"/>
-    </mc:Choice>
-    <mc:Fallback>
-      <p:transition spd="slow"/>
-    </mc:Fallback>
-  </mc:AlternateContent>
-</p:sld>
-</file>
-
-<file path=ppt/slides/slide14.xml><?xml version="1.0" encoding="utf-8"?>
-<p:sld xmlns:a="http://schemas.openxmlformats.org/drawingml/2006/main" xmlns:p="http://schemas.openxmlformats.org/presentationml/2006/main" xmlns:r="http://schemas.openxmlformats.org/officeDocument/2006/relationships" xmlns:p14="http://schemas.microsoft.com/office/powerpoint/2010/main" xmlns:p15="http://schemas.microsoft.com/office/powerpoint/2012/main" xmlns:mc="http://schemas.openxmlformats.org/markup-compatibility/2006">
-  <p:cSld>
-    <p:spTree>
-      <p:nvGrpSpPr>
-        <p:cNvPr id="1" name=""/>
-        <p:cNvGrpSpPr/>
-        <p:nvPr/>
-      </p:nvGrpSpPr>
-      <p:grpSpPr>
-        <a:xfrm>
-          <a:off x="0" y="0"/>
-          <a:ext cx="0" cy="0"/>
-          <a:chOff x="0" y="0"/>
-          <a:chExt cx="0" cy="0"/>
-        </a:xfrm>
-      </p:grpSpPr>
-      <p:sp>
-        <p:nvSpPr>
-          <p:cNvPr id="131" name="CustomShape 1"/>
-          <p:cNvSpPr/>
-          <p:nvPr/>
-        </p:nvSpPr>
-        <p:spPr>
-          <a:xfrm>
-            <a:off x="1296000" y="2232000"/>
-            <a:ext cx="8709120" cy="363960"/>
-          </a:xfrm>
-          <a:prstGeom prst="rect">
-            <a:avLst/>
-          </a:prstGeom>
-          <a:noFill/>
-          <a:ln>
-            <a:noFill/>
-          </a:ln>
-        </p:spPr>
-        <p:style>
-          <a:lnRef idx="0"/>
-          <a:fillRef idx="0"/>
-          <a:effectRef idx="0"/>
-          <a:fontRef idx="minor"/>
-        </p:style>
-        <p:txBody>
-          <a:bodyPr lIns="90000" rIns="90000" tIns="45000" bIns="45000">
-            <a:spAutoFit/>
-          </a:bodyPr>
-          <a:p>
-            <a:pPr>
-              <a:lnSpc>
-                <a:spcPct val="100000"/>
-              </a:lnSpc>
-            </a:pPr>
-            <a:r>
-              <a:rPr b="0" lang="fr-FR" sz="1800" spc="-1" strike="noStrike">
-                <a:solidFill>
-                  <a:srgbClr val="000000"/>
-                </a:solidFill>
-                <a:latin typeface="Arial"/>
-                <a:ea typeface="DejaVu Sans"/>
-              </a:rPr>
-              <a:t>CLUSTERING</a:t>
-            </a:r>
-            <a:endParaRPr b="0" lang="fr-FR" sz="1800" spc="-1" strike="noStrike">
-              <a:latin typeface="Arial"/>
-            </a:endParaRPr>
-          </a:p>
-        </p:txBody>
-      </p:sp>
-      <p:sp>
-        <p:nvSpPr>
-          <p:cNvPr id="132" name="CustomShape 2"/>
-          <p:cNvSpPr/>
-          <p:nvPr/>
-        </p:nvSpPr>
-        <p:spPr>
-          <a:xfrm>
-            <a:off x="1296000" y="3492000"/>
-            <a:ext cx="2517120" cy="2009880"/>
-          </a:xfrm>
-          <a:prstGeom prst="rect">
-            <a:avLst/>
-          </a:prstGeom>
-          <a:noFill/>
-          <a:ln>
-            <a:noFill/>
-          </a:ln>
-        </p:spPr>
-        <p:style>
-          <a:lnRef idx="0"/>
-          <a:fillRef idx="0"/>
-          <a:effectRef idx="0"/>
-          <a:fontRef idx="minor"/>
-        </p:style>
-        <p:txBody>
-          <a:bodyPr lIns="90000" rIns="90000" tIns="45000" bIns="45000">
-            <a:spAutoFit/>
-          </a:bodyPr>
-          <a:p>
-            <a:pPr>
-              <a:lnSpc>
-                <a:spcPct val="100000"/>
-              </a:lnSpc>
-            </a:pPr>
-            <a:r>
-              <a:rPr b="0" lang="fr-FR" sz="1800" spc="-1" strike="noStrike">
-                <a:solidFill>
-                  <a:srgbClr val="000000"/>
-                </a:solidFill>
-                <a:latin typeface="Arial"/>
-                <a:ea typeface="DejaVu Sans"/>
-              </a:rPr>
-              <a:t>Combinaison de deux méthodes réductions de dimensions : PCA et  T-SNE</a:t>
-            </a:r>
-            <a:endParaRPr b="0" lang="fr-FR" sz="1800" spc="-1" strike="noStrike">
-              <a:latin typeface="Arial"/>
-            </a:endParaRPr>
-          </a:p>
-          <a:p>
-            <a:pPr>
-              <a:lnSpc>
-                <a:spcPct val="100000"/>
-              </a:lnSpc>
-            </a:pPr>
-            <a:endParaRPr b="0" lang="fr-FR" sz="1800" spc="-1" strike="noStrike">
-              <a:latin typeface="Arial"/>
-            </a:endParaRPr>
-          </a:p>
-          <a:p>
-            <a:pPr>
-              <a:lnSpc>
-                <a:spcPct val="100000"/>
-              </a:lnSpc>
-            </a:pPr>
-            <a:r>
-              <a:rPr b="0" lang="fr-FR" sz="1800" spc="-1" strike="noStrike">
-                <a:solidFill>
-                  <a:srgbClr val="000000"/>
-                </a:solidFill>
-                <a:latin typeface="Arial"/>
-                <a:ea typeface="DejaVu Sans"/>
-              </a:rPr>
-              <a:t>Puis application de KMeans</a:t>
-            </a:r>
-            <a:endParaRPr b="0" lang="fr-FR" sz="1800" spc="-1" strike="noStrike">
-              <a:latin typeface="Arial"/>
-            </a:endParaRPr>
-          </a:p>
-        </p:txBody>
-      </p:sp>
-      <p:pic>
-        <p:nvPicPr>
-          <p:cNvPr id="133" name="" descr=""/>
-          <p:cNvPicPr/>
-          <p:nvPr/>
-        </p:nvPicPr>
-        <p:blipFill>
-          <a:blip r:embed="rId1"/>
-          <a:stretch/>
-        </p:blipFill>
-        <p:spPr>
-          <a:xfrm>
-            <a:off x="3929040" y="1728000"/>
-            <a:ext cx="6968160" cy="4707000"/>
-          </a:xfrm>
-          <a:prstGeom prst="rect">
-            <a:avLst/>
-          </a:prstGeom>
-          <a:ln>
-            <a:noFill/>
-          </a:ln>
-        </p:spPr>
-      </p:pic>
-    </p:spTree>
-  </p:cSld>
-  <mc:AlternateContent>
-    <mc:Choice Requires="p14">
-      <p:transition spd="slow" p14:dur="2000"/>
-    </mc:Choice>
-    <mc:Fallback>
-      <p:transition spd="slow"/>
-    </mc:Fallback>
-  </mc:AlternateContent>
-</p:sld>
-</file>
-
-<file path=ppt/slides/slide15.xml><?xml version="1.0" encoding="utf-8"?>
-<p:sld xmlns:a="http://schemas.openxmlformats.org/drawingml/2006/main" xmlns:p="http://schemas.openxmlformats.org/presentationml/2006/main" xmlns:r="http://schemas.openxmlformats.org/officeDocument/2006/relationships" xmlns:p14="http://schemas.microsoft.com/office/powerpoint/2010/main" xmlns:p15="http://schemas.microsoft.com/office/powerpoint/2012/main" xmlns:mc="http://schemas.openxmlformats.org/markup-compatibility/2006">
-  <p:cSld>
-    <p:spTree>
-      <p:nvGrpSpPr>
-        <p:cNvPr id="1" name=""/>
-        <p:cNvGrpSpPr/>
-        <p:nvPr/>
-      </p:nvGrpSpPr>
-      <p:grpSpPr>
-        <a:xfrm>
-          <a:off x="0" y="0"/>
-          <a:ext cx="0" cy="0"/>
-          <a:chOff x="0" y="0"/>
-          <a:chExt cx="0" cy="0"/>
-        </a:xfrm>
-      </p:grpSpPr>
-      <p:sp>
-        <p:nvSpPr>
-          <p:cNvPr id="134" name="CustomShape 1"/>
-          <p:cNvSpPr/>
-          <p:nvPr/>
-        </p:nvSpPr>
-        <p:spPr>
-          <a:xfrm>
-            <a:off x="1296000" y="2232000"/>
-            <a:ext cx="8709120" cy="363960"/>
-          </a:xfrm>
-          <a:prstGeom prst="rect">
-            <a:avLst/>
-          </a:prstGeom>
-          <a:noFill/>
-          <a:ln>
-            <a:noFill/>
-          </a:ln>
-        </p:spPr>
-        <p:style>
-          <a:lnRef idx="0"/>
-          <a:fillRef idx="0"/>
-          <a:effectRef idx="0"/>
-          <a:fontRef idx="minor"/>
-        </p:style>
-        <p:txBody>
-          <a:bodyPr lIns="90000" rIns="90000" tIns="45000" bIns="45000">
-            <a:spAutoFit/>
-          </a:bodyPr>
-          <a:p>
-            <a:pPr>
-              <a:lnSpc>
-                <a:spcPct val="100000"/>
-              </a:lnSpc>
-            </a:pPr>
-            <a:r>
-              <a:rPr b="0" lang="fr-FR" sz="1800" spc="-1" strike="noStrike">
-                <a:solidFill>
-                  <a:srgbClr val="000000"/>
-                </a:solidFill>
-                <a:latin typeface="Arial"/>
-                <a:ea typeface="DejaVu Sans"/>
-              </a:rPr>
-              <a:t>MATRICE DE CONFUSION</a:t>
-            </a:r>
-            <a:endParaRPr b="0" lang="fr-FR" sz="1800" spc="-1" strike="noStrike">
-              <a:latin typeface="Arial"/>
-            </a:endParaRPr>
-          </a:p>
-        </p:txBody>
-      </p:sp>
-      <p:pic>
-        <p:nvPicPr>
-          <p:cNvPr id="135" name="" descr=""/>
-          <p:cNvPicPr/>
-          <p:nvPr/>
-        </p:nvPicPr>
-        <p:blipFill>
-          <a:blip r:embed="rId1"/>
-          <a:stretch/>
-        </p:blipFill>
-        <p:spPr>
-          <a:xfrm>
-            <a:off x="4968000" y="1190160"/>
-            <a:ext cx="5645520" cy="4854960"/>
-          </a:xfrm>
-          <a:prstGeom prst="rect">
-            <a:avLst/>
-          </a:prstGeom>
-          <a:ln>
-            <a:noFill/>
-          </a:ln>
-        </p:spPr>
-      </p:pic>
-      <p:pic>
-        <p:nvPicPr>
-          <p:cNvPr id="136" name="" descr=""/>
-          <p:cNvPicPr/>
-          <p:nvPr/>
-        </p:nvPicPr>
-        <p:blipFill>
-          <a:blip r:embed="rId2"/>
-          <a:stretch/>
-        </p:blipFill>
-        <p:spPr>
-          <a:xfrm>
-            <a:off x="866880" y="3528000"/>
-            <a:ext cx="4026240" cy="2254680"/>
-          </a:xfrm>
-          <a:prstGeom prst="rect">
-            <a:avLst/>
-          </a:prstGeom>
-          <a:ln>
-            <a:noFill/>
-          </a:ln>
-        </p:spPr>
-      </p:pic>
-    </p:spTree>
-  </p:cSld>
-  <mc:AlternateContent>
-    <mc:Choice Requires="p14">
-      <p:transition spd="slow" p14:dur="2000"/>
-    </mc:Choice>
-    <mc:Fallback>
-      <p:transition spd="slow"/>
-    </mc:Fallback>
-  </mc:AlternateContent>
-</p:sld>
-</file>
-
-<file path=ppt/slides/slide16.xml><?xml version="1.0" encoding="utf-8"?>
-<p:sld xmlns:a="http://schemas.openxmlformats.org/drawingml/2006/main" xmlns:p="http://schemas.openxmlformats.org/presentationml/2006/main" xmlns:r="http://schemas.openxmlformats.org/officeDocument/2006/relationships" xmlns:p14="http://schemas.microsoft.com/office/powerpoint/2010/main" xmlns:p15="http://schemas.microsoft.com/office/powerpoint/2012/main" xmlns:mc="http://schemas.openxmlformats.org/markup-compatibility/2006">
-  <p:cSld>
-    <p:spTree>
-      <p:nvGrpSpPr>
-        <p:cNvPr id="1" name=""/>
-        <p:cNvGrpSpPr/>
-        <p:nvPr/>
-      </p:nvGrpSpPr>
-      <p:grpSpPr>
-        <a:xfrm>
-          <a:off x="0" y="0"/>
-          <a:ext cx="0" cy="0"/>
-          <a:chOff x="0" y="0"/>
-          <a:chExt cx="0" cy="0"/>
-        </a:xfrm>
-      </p:grpSpPr>
-      <p:sp>
-        <p:nvSpPr>
-          <p:cNvPr id="137" name="CustomShape 1"/>
-          <p:cNvSpPr/>
-          <p:nvPr/>
-        </p:nvSpPr>
-        <p:spPr>
-          <a:xfrm>
-            <a:off x="1097280" y="879480"/>
-            <a:ext cx="10049040" cy="930600"/>
-          </a:xfrm>
-          <a:prstGeom prst="rect">
-            <a:avLst/>
-          </a:prstGeom>
-          <a:noFill/>
-          <a:ln>
-            <a:noFill/>
-          </a:ln>
-        </p:spPr>
-        <p:style>
-          <a:lnRef idx="0"/>
-          <a:fillRef idx="0"/>
-          <a:effectRef idx="0"/>
-          <a:fontRef idx="minor"/>
-        </p:style>
-        <p:txBody>
-          <a:bodyPr lIns="0" rIns="0" tIns="45000" bIns="45000">
-            <a:normAutofit fontScale="55000"/>
-          </a:bodyPr>
-          <a:p>
-            <a:pPr algn="ctr">
-              <a:lnSpc>
-                <a:spcPct val="110000"/>
-              </a:lnSpc>
-              <a:spcBef>
-                <a:spcPts val="1199"/>
-              </a:spcBef>
-              <a:spcAft>
-                <a:spcPts val="201"/>
-              </a:spcAft>
-            </a:pPr>
-            <a:r>
-              <a:rPr b="0" lang="fr-FR" sz="4000" spc="-1" strike="noStrike">
-                <a:solidFill>
-                  <a:srgbClr val="404040"/>
-                </a:solidFill>
-                <a:latin typeface="Franklin Gothic Book"/>
-                <a:ea typeface="DejaVu Sans"/>
-              </a:rPr>
-              <a:t>V – Conclusion et recommandation sur la faisabilité du moteur</a:t>
-            </a:r>
-            <a:endParaRPr b="0" lang="fr-FR" sz="4000" spc="-1" strike="noStrike">
-              <a:latin typeface="Arial"/>
-            </a:endParaRPr>
-          </a:p>
-        </p:txBody>
-      </p:sp>
-      <p:sp>
-        <p:nvSpPr>
-          <p:cNvPr id="138" name="CustomShape 2"/>
-          <p:cNvSpPr/>
-          <p:nvPr/>
-        </p:nvSpPr>
-        <p:spPr>
-          <a:xfrm>
-            <a:off x="1368000" y="2232000"/>
-            <a:ext cx="9717480" cy="3443760"/>
-          </a:xfrm>
-          <a:prstGeom prst="rect">
-            <a:avLst/>
-          </a:prstGeom>
-          <a:noFill/>
-          <a:ln>
-            <a:noFill/>
-          </a:ln>
-        </p:spPr>
-        <p:style>
-          <a:lnRef idx="0"/>
-          <a:fillRef idx="0"/>
-          <a:effectRef idx="0"/>
-          <a:fontRef idx="minor"/>
-        </p:style>
-        <p:txBody>
-          <a:bodyPr lIns="90000" rIns="90000" tIns="45000" bIns="45000">
-            <a:spAutoFit/>
-          </a:bodyPr>
-          <a:p>
-            <a:pPr>
-              <a:lnSpc>
-                <a:spcPct val="100000"/>
-              </a:lnSpc>
-            </a:pPr>
-            <a:r>
-              <a:rPr b="0" lang="fr-FR" sz="2000" spc="-1" strike="noStrike">
-                <a:solidFill>
-                  <a:srgbClr val="000000"/>
-                </a:solidFill>
-                <a:latin typeface="Arial"/>
-                <a:ea typeface="DejaVu Sans"/>
-              </a:rPr>
-              <a:t>LA BONNE RÉPARTITION DES CLUSTERS INDUIT LA FAISABILITÉ DU MOTEUR DE CLASSIFICATION AUTOMATIQUE. TOUTEFOIS, LES RATIOS D’ÉVALUATION SONT TRÈS FAIBLES.</a:t>
-            </a:r>
-            <a:endParaRPr b="0" lang="fr-FR" sz="2000" spc="-1" strike="noStrike">
-              <a:latin typeface="Arial"/>
-            </a:endParaRPr>
-          </a:p>
-          <a:p>
-            <a:pPr>
-              <a:lnSpc>
-                <a:spcPct val="100000"/>
-              </a:lnSpc>
-            </a:pPr>
-            <a:endParaRPr b="0" lang="fr-FR" sz="2000" spc="-1" strike="noStrike">
-              <a:latin typeface="Arial"/>
-            </a:endParaRPr>
-          </a:p>
-          <a:p>
-            <a:pPr>
-              <a:lnSpc>
-                <a:spcPct val="100000"/>
-              </a:lnSpc>
-            </a:pPr>
-            <a:r>
-              <a:rPr b="0" lang="fr-FR" sz="2000" spc="-1" strike="noStrike">
-                <a:solidFill>
-                  <a:srgbClr val="000000"/>
-                </a:solidFill>
-                <a:latin typeface="Arial"/>
-                <a:ea typeface="DejaVu Sans"/>
-              </a:rPr>
-              <a:t>EN EFFET, LA PRÉCISION ENTRE LES CLUSTERS IMAGE ET TEXTE EST DE 0,37.</a:t>
-            </a:r>
-            <a:endParaRPr b="0" lang="fr-FR" sz="2000" spc="-1" strike="noStrike">
-              <a:latin typeface="Arial"/>
-            </a:endParaRPr>
-          </a:p>
-          <a:p>
-            <a:pPr>
-              <a:lnSpc>
-                <a:spcPct val="100000"/>
-              </a:lnSpc>
-            </a:pPr>
-            <a:endParaRPr b="0" lang="fr-FR" sz="2000" spc="-1" strike="noStrike">
-              <a:latin typeface="Arial"/>
-            </a:endParaRPr>
-          </a:p>
-          <a:p>
-            <a:pPr>
-              <a:lnSpc>
-                <a:spcPct val="100000"/>
-              </a:lnSpc>
-            </a:pPr>
-            <a:r>
-              <a:rPr b="0" lang="fr-FR" sz="2000" spc="-1" strike="noStrike">
-                <a:solidFill>
-                  <a:srgbClr val="000000"/>
-                </a:solidFill>
-                <a:latin typeface="Arial"/>
-                <a:ea typeface="Microsoft YaHei"/>
-              </a:rPr>
-              <a:t>DES MÉTHODES AUTRES QUE LE SIFT (EXEMPLE CNN) SERAIENT A ENVISAGER POUR AMÉLIORER LES SCORES. PAR AILLEURS, LE NOMBRE CROISSANT D’ÉCHANTILLONS DEVRAIT PERMETTRE D’AMÉLIORER L’APPRENTISSAGE DU MODÈLE.</a:t>
-            </a:r>
-            <a:endParaRPr b="0" lang="fr-FR" sz="2000" spc="-1" strike="noStrike">
-              <a:latin typeface="Arial"/>
-            </a:endParaRPr>
-          </a:p>
-        </p:txBody>
-      </p:sp>
-    </p:spTree>
-  </p:cSld>
-  <mc:AlternateContent>
-    <mc:Choice Requires="p14">
-      <p:transition spd="slow" p14:dur="2000"/>
-    </mc:Choice>
-    <mc:Fallback>
-      <p:transition spd="slow"/>
-    </mc:Fallback>
-  </mc:AlternateContent>
-</p:sld>
-</file>
-
-<file path=ppt/slides/slide17.xml><?xml version="1.0" encoding="utf-8"?>
-<p:sld xmlns:a="http://schemas.openxmlformats.org/drawingml/2006/main" xmlns:p="http://schemas.openxmlformats.org/presentationml/2006/main" xmlns:r="http://schemas.openxmlformats.org/officeDocument/2006/relationships" xmlns:p14="http://schemas.microsoft.com/office/powerpoint/2010/main" xmlns:p15="http://schemas.microsoft.com/office/powerpoint/2012/main" xmlns:mc="http://schemas.openxmlformats.org/markup-compatibility/2006">
-  <p:cSld>
-    <p:spTree>
-      <p:nvGrpSpPr>
-        <p:cNvPr id="1" name=""/>
-        <p:cNvGrpSpPr/>
-        <p:nvPr/>
-      </p:nvGrpSpPr>
-      <p:grpSpPr>
-        <a:xfrm>
-          <a:off x="0" y="0"/>
-          <a:ext cx="0" cy="0"/>
-          <a:chOff x="0" y="0"/>
-          <a:chExt cx="0" cy="0"/>
-        </a:xfrm>
-      </p:grpSpPr>
-      <p:sp>
-        <p:nvSpPr>
-          <p:cNvPr id="139" name="CustomShape 1"/>
+          <p:cNvPr id="125" name="CustomShape 1"/>
           <p:cNvSpPr/>
           <p:nvPr/>
         </p:nvSpPr>
@@ -5117,7 +4448,7 @@
       </p:sp>
       <p:sp>
         <p:nvSpPr>
-          <p:cNvPr id="140" name="CustomShape 2"/>
+          <p:cNvPr id="126" name="CustomShape 2"/>
           <p:cNvSpPr/>
           <p:nvPr/>
         </p:nvSpPr>
@@ -5150,7 +4481,7 @@
                 <a:spcPct val="100000"/>
               </a:lnSpc>
             </a:pPr>
-            <a:fld id="{9805B5F6-149A-4B35-AE48-9962C169D45A}" type="datetime1">
+            <a:fld id="{42B88DAB-2A40-42BC-BA55-C6E6F57D7E65}" type="datetime1">
               <a:rPr b="0" lang="fr-FR" sz="800" spc="-1" strike="noStrike">
                 <a:solidFill>
                   <a:srgbClr val="ffffff"/>
@@ -5367,7 +4698,7 @@
                 <a:latin typeface="Bookman Old Style"/>
                 <a:ea typeface="DejaVu Sans"/>
               </a:rPr>
-              <a:t>V – Conclusion et recommandations </a:t>
+              <a:t>VI – Conclusion et recommandations </a:t>
             </a:r>
             <a:endParaRPr b="0" lang="fr-FR" sz="4000" spc="-1" strike="noStrike">
               <a:latin typeface="Arial"/>

</xml_diff>